<commit_message>
Mise en cohérence des fichiers
</commit_message>
<xml_diff>
--- a/201809-FabIoTLab-Objet connecte.pptx
+++ b/201809-FabIoTLab-Objet connecte.pptx
@@ -5,10 +5,10 @@
     <p:sldMasterId id="2147483660" r:id="rId1"/>
   </p:sldMasterIdLst>
   <p:notesMasterIdLst>
-    <p:notesMasterId r:id="rId32"/>
+    <p:notesMasterId r:id="rId33"/>
   </p:notesMasterIdLst>
   <p:handoutMasterIdLst>
-    <p:handoutMasterId r:id="rId33"/>
+    <p:handoutMasterId r:id="rId34"/>
   </p:handoutMasterIdLst>
   <p:sldIdLst>
     <p:sldId id="256" r:id="rId2"/>
@@ -18,29 +18,30 @@
     <p:sldId id="273" r:id="rId6"/>
     <p:sldId id="274" r:id="rId7"/>
     <p:sldId id="259" r:id="rId8"/>
-    <p:sldId id="293" r:id="rId9"/>
-    <p:sldId id="295" r:id="rId10"/>
-    <p:sldId id="296" r:id="rId11"/>
-    <p:sldId id="297" r:id="rId12"/>
-    <p:sldId id="298" r:id="rId13"/>
-    <p:sldId id="299" r:id="rId14"/>
-    <p:sldId id="300" r:id="rId15"/>
-    <p:sldId id="301" r:id="rId16"/>
-    <p:sldId id="302" r:id="rId17"/>
-    <p:sldId id="303" r:id="rId18"/>
-    <p:sldId id="305" r:id="rId19"/>
-    <p:sldId id="306" r:id="rId20"/>
-    <p:sldId id="312" r:id="rId21"/>
-    <p:sldId id="313" r:id="rId22"/>
-    <p:sldId id="314" r:id="rId23"/>
-    <p:sldId id="315" r:id="rId24"/>
-    <p:sldId id="316" r:id="rId25"/>
-    <p:sldId id="307" r:id="rId26"/>
-    <p:sldId id="308" r:id="rId27"/>
-    <p:sldId id="309" r:id="rId28"/>
-    <p:sldId id="275" r:id="rId29"/>
-    <p:sldId id="266" r:id="rId30"/>
-    <p:sldId id="291" r:id="rId31"/>
+    <p:sldId id="317" r:id="rId9"/>
+    <p:sldId id="293" r:id="rId10"/>
+    <p:sldId id="295" r:id="rId11"/>
+    <p:sldId id="296" r:id="rId12"/>
+    <p:sldId id="297" r:id="rId13"/>
+    <p:sldId id="298" r:id="rId14"/>
+    <p:sldId id="299" r:id="rId15"/>
+    <p:sldId id="300" r:id="rId16"/>
+    <p:sldId id="301" r:id="rId17"/>
+    <p:sldId id="302" r:id="rId18"/>
+    <p:sldId id="303" r:id="rId19"/>
+    <p:sldId id="305" r:id="rId20"/>
+    <p:sldId id="306" r:id="rId21"/>
+    <p:sldId id="312" r:id="rId22"/>
+    <p:sldId id="313" r:id="rId23"/>
+    <p:sldId id="314" r:id="rId24"/>
+    <p:sldId id="315" r:id="rId25"/>
+    <p:sldId id="316" r:id="rId26"/>
+    <p:sldId id="307" r:id="rId27"/>
+    <p:sldId id="308" r:id="rId28"/>
+    <p:sldId id="309" r:id="rId29"/>
+    <p:sldId id="275" r:id="rId30"/>
+    <p:sldId id="266" r:id="rId31"/>
+    <p:sldId id="291" r:id="rId32"/>
   </p:sldIdLst>
   <p:sldSz cx="12192000" cy="6858000"/>
   <p:notesSz cx="6858000" cy="9144000"/>
@@ -159,6 +160,7 @@
             <p14:sldId id="273"/>
             <p14:sldId id="274"/>
             <p14:sldId id="259"/>
+            <p14:sldId id="317"/>
           </p14:sldIdLst>
         </p14:section>
         <p14:section name="Microcontrôleur" id="{EF162FA9-BD80-45DC-89CE-72E082FCC661}">
@@ -3861,7 +3863,7 @@
           <a:p>
             <a:fld id="{84053696-5A28-49B8-AD53-284C40D5F931}" type="slidenum">
               <a:rPr lang="fr-BE" smtClean="0"/>
-              <a:t>30</a:t>
+              <a:t>31</a:t>
             </a:fld>
             <a:endParaRPr lang="fr-BE"/>
           </a:p>
@@ -4588,7 +4590,7 @@
           <a:p>
             <a:fld id="{2E287E8F-1FAE-423F-A76E-7D2F0B0D4198}" type="slidenum">
               <a:rPr lang="fr-BE" smtClean="0"/>
-              <a:t>9</a:t>
+              <a:t>10</a:t>
             </a:fld>
             <a:endParaRPr lang="fr-BE"/>
           </a:p>
@@ -4810,7 +4812,7 @@
           <a:p>
             <a:fld id="{2E287E8F-1FAE-423F-A76E-7D2F0B0D4198}" type="slidenum">
               <a:rPr lang="fr-BE" smtClean="0"/>
-              <a:t>11</a:t>
+              <a:t>12</a:t>
             </a:fld>
             <a:endParaRPr lang="fr-BE"/>
           </a:p>
@@ -4971,7 +4973,7 @@
           <a:p>
             <a:fld id="{2E287E8F-1FAE-423F-A76E-7D2F0B0D4198}" type="slidenum">
               <a:rPr lang="fr-BE" smtClean="0"/>
-              <a:t>21</a:t>
+              <a:t>22</a:t>
             </a:fld>
             <a:endParaRPr lang="fr-BE"/>
           </a:p>
@@ -5137,7 +5139,7 @@
           <a:p>
             <a:fld id="{84053696-5A28-49B8-AD53-284C40D5F931}" type="slidenum">
               <a:rPr lang="fr-BE" smtClean="0"/>
-              <a:t>28</a:t>
+              <a:t>29</a:t>
             </a:fld>
             <a:endParaRPr lang="fr-BE"/>
           </a:p>
@@ -5250,7 +5252,7 @@
           <a:p>
             <a:fld id="{84053696-5A28-49B8-AD53-284C40D5F931}" type="slidenum">
               <a:rPr lang="fr-BE" smtClean="0"/>
-              <a:t>29</a:t>
+              <a:t>30</a:t>
             </a:fld>
             <a:endParaRPr lang="fr-BE"/>
           </a:p>
@@ -5429,7 +5431,7 @@
           <a:p>
             <a:fld id="{3A567DEB-8635-4319-A1E1-9377413CA911}" type="datetime1">
               <a:rPr lang="fr-BE" smtClean="0"/>
-              <a:t>16-09-18</a:t>
+              <a:t>17-09-18</a:t>
             </a:fld>
             <a:endParaRPr lang="fr-BE"/>
           </a:p>
@@ -5599,7 +5601,7 @@
           <a:p>
             <a:fld id="{0CBE051F-498F-4C45-80EC-ED9104545F83}" type="datetime1">
               <a:rPr lang="fr-BE" smtClean="0"/>
-              <a:t>16-09-18</a:t>
+              <a:t>17-09-18</a:t>
             </a:fld>
             <a:endParaRPr lang="fr-BE"/>
           </a:p>
@@ -5779,7 +5781,7 @@
           <a:p>
             <a:fld id="{EFC1E6E9-C1D5-47F6-BDB5-7600151E1073}" type="datetime1">
               <a:rPr lang="fr-BE" smtClean="0"/>
-              <a:t>16-09-18</a:t>
+              <a:t>17-09-18</a:t>
             </a:fld>
             <a:endParaRPr lang="fr-BE"/>
           </a:p>
@@ -5949,7 +5951,7 @@
           <a:p>
             <a:fld id="{A3363593-CB55-4106-9932-2FA27BBDB81C}" type="datetime1">
               <a:rPr lang="fr-BE" smtClean="0"/>
-              <a:t>16-09-18</a:t>
+              <a:t>17-09-18</a:t>
             </a:fld>
             <a:endParaRPr lang="fr-BE"/>
           </a:p>
@@ -6195,7 +6197,7 @@
           <a:p>
             <a:fld id="{50E5FA2B-2087-48F8-8BDE-3B823FFE30DF}" type="datetime1">
               <a:rPr lang="fr-BE" smtClean="0"/>
-              <a:t>16-09-18</a:t>
+              <a:t>17-09-18</a:t>
             </a:fld>
             <a:endParaRPr lang="fr-BE"/>
           </a:p>
@@ -6427,7 +6429,7 @@
           <a:p>
             <a:fld id="{14535104-D043-4D85-A0FA-80DEDC5FE087}" type="datetime1">
               <a:rPr lang="fr-BE" smtClean="0"/>
-              <a:t>16-09-18</a:t>
+              <a:t>17-09-18</a:t>
             </a:fld>
             <a:endParaRPr lang="fr-BE"/>
           </a:p>
@@ -6794,7 +6796,7 @@
           <a:p>
             <a:fld id="{062387A1-EBA7-4196-A57D-48155766B455}" type="datetime1">
               <a:rPr lang="fr-BE" smtClean="0"/>
-              <a:t>16-09-18</a:t>
+              <a:t>17-09-18</a:t>
             </a:fld>
             <a:endParaRPr lang="fr-BE"/>
           </a:p>
@@ -6912,7 +6914,7 @@
           <a:p>
             <a:fld id="{A41267EF-624E-4A1F-BF99-3633CECA0E02}" type="datetime1">
               <a:rPr lang="fr-BE" smtClean="0"/>
-              <a:t>16-09-18</a:t>
+              <a:t>17-09-18</a:t>
             </a:fld>
             <a:endParaRPr lang="fr-BE"/>
           </a:p>
@@ -7007,7 +7009,7 @@
           <a:p>
             <a:fld id="{FDD99070-9B2D-47B1-873E-A4CCF3DE25AC}" type="datetime1">
               <a:rPr lang="fr-BE" smtClean="0"/>
-              <a:t>16-09-18</a:t>
+              <a:t>17-09-18</a:t>
             </a:fld>
             <a:endParaRPr lang="fr-BE"/>
           </a:p>
@@ -7284,7 +7286,7 @@
           <a:p>
             <a:fld id="{7B4102C4-C38C-45D4-A46D-D72F1FCEEF1A}" type="datetime1">
               <a:rPr lang="fr-BE" smtClean="0"/>
-              <a:t>16-09-18</a:t>
+              <a:t>17-09-18</a:t>
             </a:fld>
             <a:endParaRPr lang="fr-BE"/>
           </a:p>
@@ -7541,7 +7543,7 @@
           <a:p>
             <a:fld id="{4439CAD1-362D-4610-9313-3B594B7118BE}" type="datetime1">
               <a:rPr lang="fr-BE" smtClean="0"/>
-              <a:t>16-09-18</a:t>
+              <a:t>17-09-18</a:t>
             </a:fld>
             <a:endParaRPr lang="fr-BE"/>
           </a:p>
@@ -7754,7 +7756,7 @@
           <a:p>
             <a:fld id="{8591E4D5-B6AB-4D27-AEB3-3F0BF7D7AF83}" type="datetime1">
               <a:rPr lang="fr-BE" smtClean="0"/>
-              <a:t>16-09-18</a:t>
+              <a:t>17-09-18</a:t>
             </a:fld>
             <a:endParaRPr lang="fr-BE"/>
           </a:p>
@@ -8416,6 +8418,136 @@
       </p:grpSpPr>
       <p:sp>
         <p:nvSpPr>
+          <p:cNvPr id="2" name="Titre 1">
+            <a:extLst>
+              <a:ext uri="{FF2B5EF4-FFF2-40B4-BE49-F238E27FC236}">
+                <a16:creationId xmlns:a16="http://schemas.microsoft.com/office/drawing/2014/main" id="{C5F8775F-9662-4050-98FB-A838A4FEE2C8}"/>
+              </a:ext>
+            </a:extLst>
+          </p:cNvPr>
+          <p:cNvSpPr>
+            <a:spLocks noGrp="1"/>
+          </p:cNvSpPr>
+          <p:nvPr>
+            <p:ph type="title"/>
+          </p:nvPr>
+        </p:nvSpPr>
+        <p:spPr/>
+        <p:txBody>
+          <a:bodyPr/>
+          <a:lstStyle/>
+          <a:p>
+            <a:r>
+              <a:rPr lang="en-US"/>
+              <a:t>ESP8266</a:t>
+            </a:r>
+          </a:p>
+        </p:txBody>
+      </p:sp>
+      <p:pic>
+        <p:nvPicPr>
+          <p:cNvPr id="1026" name="Picture 2" descr="RÃ©sultat de recherche d'images pour &quot;nodemcu esp8266 amica&quot;">
+            <a:extLst>
+              <a:ext uri="{FF2B5EF4-FFF2-40B4-BE49-F238E27FC236}">
+                <a16:creationId xmlns:a16="http://schemas.microsoft.com/office/drawing/2014/main" id="{C57719E7-0D22-41C8-B7F4-DEC8BBF076D5}"/>
+              </a:ext>
+            </a:extLst>
+          </p:cNvPr>
+          <p:cNvPicPr>
+            <a:picLocks noGrp="1" noChangeAspect="1" noChangeArrowheads="1"/>
+          </p:cNvPicPr>
+          <p:nvPr>
+            <p:ph idx="1"/>
+          </p:nvPr>
+        </p:nvPicPr>
+        <p:blipFill rotWithShape="1">
+          <a:blip r:embed="rId3">
+            <a:extLst>
+              <a:ext uri="{28A0092B-C50C-407E-A947-70E740481C1C}">
+                <a14:useLocalDpi xmlns:a14="http://schemas.microsoft.com/office/drawing/2010/main" val="0"/>
+              </a:ext>
+            </a:extLst>
+          </a:blip>
+          <a:srcRect t="6758" b="8972"/>
+          <a:stretch/>
+        </p:blipFill>
+        <p:spPr>
+          <a:xfrm>
+            <a:off x="2224534" y="1825625"/>
+            <a:ext cx="7742931" cy="4351338"/>
+          </a:xfrm>
+        </p:spPr>
+      </p:pic>
+      <p:sp>
+        <p:nvSpPr>
+          <p:cNvPr id="4" name="Espace réservé du numéro de diapositive 3">
+            <a:extLst>
+              <a:ext uri="{FF2B5EF4-FFF2-40B4-BE49-F238E27FC236}">
+                <a16:creationId xmlns:a16="http://schemas.microsoft.com/office/drawing/2014/main" id="{0A0CA7B0-2512-4C05-8663-5F6BFE309B05}"/>
+              </a:ext>
+            </a:extLst>
+          </p:cNvPr>
+          <p:cNvSpPr>
+            <a:spLocks noGrp="1"/>
+          </p:cNvSpPr>
+          <p:nvPr>
+            <p:ph type="sldNum" sz="quarter" idx="12"/>
+          </p:nvPr>
+        </p:nvSpPr>
+        <p:spPr/>
+        <p:txBody>
+          <a:bodyPr/>
+          <a:lstStyle/>
+          <a:p>
+            <a:fld id="{7D3627B9-1F90-4568-B521-4CB3E5CC102E}" type="slidenum">
+              <a:rPr lang="en-US" smtClean="0"/>
+              <a:pPr/>
+              <a:t>10</a:t>
+            </a:fld>
+            <a:endParaRPr lang="en-US"/>
+          </a:p>
+        </p:txBody>
+      </p:sp>
+    </p:spTree>
+    <p:extLst>
+      <p:ext uri="{BB962C8B-B14F-4D97-AF65-F5344CB8AC3E}">
+        <p14:creationId xmlns:p14="http://schemas.microsoft.com/office/powerpoint/2010/main" val="3504272572"/>
+      </p:ext>
+    </p:extLst>
+  </p:cSld>
+  <p:clrMapOvr>
+    <a:masterClrMapping/>
+  </p:clrMapOvr>
+</p:sld>
+</file>
+
+<file path=ppt/slides/slide11.xml><?xml version="1.0" encoding="utf-8"?>
+<p:sld xmlns:a="http://schemas.openxmlformats.org/drawingml/2006/main" xmlns:r="http://schemas.openxmlformats.org/officeDocument/2006/relationships" xmlns:p="http://schemas.openxmlformats.org/presentationml/2006/main">
+  <p:cSld>
+    <p:bg>
+      <p:bgPr>
+        <a:solidFill>
+          <a:schemeClr val="bg1"/>
+        </a:solidFill>
+        <a:effectLst/>
+      </p:bgPr>
+    </p:bg>
+    <p:spTree>
+      <p:nvGrpSpPr>
+        <p:cNvPr id="1" name=""/>
+        <p:cNvGrpSpPr/>
+        <p:nvPr/>
+      </p:nvGrpSpPr>
+      <p:grpSpPr>
+        <a:xfrm>
+          <a:off x="0" y="0"/>
+          <a:ext cx="0" cy="0"/>
+          <a:chOff x="0" y="0"/>
+          <a:chExt cx="0" cy="0"/>
+        </a:xfrm>
+      </p:grpSpPr>
+      <p:sp>
+        <p:nvSpPr>
           <p:cNvPr id="3" name="Espace réservé du numéro de diapositive 2">
             <a:extLst>
               <a:ext uri="{FF2B5EF4-FFF2-40B4-BE49-F238E27FC236}">
@@ -8437,7 +8569,7 @@
           <a:p>
             <a:fld id="{7D3627B9-1F90-4568-B521-4CB3E5CC102E}" type="slidenum">
               <a:rPr lang="fr-BE" smtClean="0"/>
-              <a:t>10</a:t>
+              <a:t>11</a:t>
             </a:fld>
             <a:endParaRPr lang="fr-BE"/>
           </a:p>
@@ -8505,121 +8637,6 @@
 </p:sld>
 </file>
 
-<file path=ppt/slides/slide11.xml><?xml version="1.0" encoding="utf-8"?>
-<p:sld xmlns:a="http://schemas.openxmlformats.org/drawingml/2006/main" xmlns:r="http://schemas.openxmlformats.org/officeDocument/2006/relationships" xmlns:p="http://schemas.openxmlformats.org/presentationml/2006/main">
-  <p:cSld>
-    <p:spTree>
-      <p:nvGrpSpPr>
-        <p:cNvPr id="1" name=""/>
-        <p:cNvGrpSpPr/>
-        <p:nvPr/>
-      </p:nvGrpSpPr>
-      <p:grpSpPr>
-        <a:xfrm>
-          <a:off x="0" y="0"/>
-          <a:ext cx="0" cy="0"/>
-          <a:chOff x="0" y="0"/>
-          <a:chExt cx="0" cy="0"/>
-        </a:xfrm>
-      </p:grpSpPr>
-      <p:sp>
-        <p:nvSpPr>
-          <p:cNvPr id="2" name="Titre 1">
-            <a:extLst>
-              <a:ext uri="{FF2B5EF4-FFF2-40B4-BE49-F238E27FC236}">
-                <a16:creationId xmlns:a16="http://schemas.microsoft.com/office/drawing/2014/main" id="{E7253B32-417E-4C48-918C-CE54FDF90181}"/>
-              </a:ext>
-            </a:extLst>
-          </p:cNvPr>
-          <p:cNvSpPr>
-            <a:spLocks noGrp="1"/>
-          </p:cNvSpPr>
-          <p:nvPr>
-            <p:ph type="title"/>
-          </p:nvPr>
-        </p:nvSpPr>
-        <p:spPr/>
-        <p:txBody>
-          <a:bodyPr/>
-          <a:lstStyle/>
-          <a:p>
-            <a:r>
-              <a:rPr lang="fr-BE" dirty="0"/>
-              <a:t>Exercice 1</a:t>
-            </a:r>
-          </a:p>
-        </p:txBody>
-      </p:sp>
-      <p:sp>
-        <p:nvSpPr>
-          <p:cNvPr id="3" name="Espace réservé du contenu 2">
-            <a:extLst>
-              <a:ext uri="{FF2B5EF4-FFF2-40B4-BE49-F238E27FC236}">
-                <a16:creationId xmlns:a16="http://schemas.microsoft.com/office/drawing/2014/main" id="{C190E0AF-5E1E-48CB-861F-7CA9A2AD777B}"/>
-              </a:ext>
-            </a:extLst>
-          </p:cNvPr>
-          <p:cNvSpPr>
-            <a:spLocks noGrp="1"/>
-          </p:cNvSpPr>
-          <p:nvPr>
-            <p:ph idx="1"/>
-          </p:nvPr>
-        </p:nvSpPr>
-        <p:spPr/>
-        <p:txBody>
-          <a:bodyPr/>
-          <a:lstStyle/>
-          <a:p>
-            <a:r>
-              <a:rPr lang="fr-BE" dirty="0"/>
-              <a:t>Faire clignoter la LED</a:t>
-            </a:r>
-          </a:p>
-        </p:txBody>
-      </p:sp>
-      <p:sp>
-        <p:nvSpPr>
-          <p:cNvPr id="5" name="Espace réservé du numéro de diapositive 4">
-            <a:extLst>
-              <a:ext uri="{FF2B5EF4-FFF2-40B4-BE49-F238E27FC236}">
-                <a16:creationId xmlns:a16="http://schemas.microsoft.com/office/drawing/2014/main" id="{95A66774-C3BB-4F2A-ABE4-88A87D52382F}"/>
-              </a:ext>
-            </a:extLst>
-          </p:cNvPr>
-          <p:cNvSpPr>
-            <a:spLocks noGrp="1"/>
-          </p:cNvSpPr>
-          <p:nvPr>
-            <p:ph type="sldNum" sz="quarter" idx="12"/>
-          </p:nvPr>
-        </p:nvSpPr>
-        <p:spPr/>
-        <p:txBody>
-          <a:bodyPr/>
-          <a:lstStyle/>
-          <a:p>
-            <a:fld id="{7D3627B9-1F90-4568-B521-4CB3E5CC102E}" type="slidenum">
-              <a:rPr lang="fr-BE" smtClean="0"/>
-              <a:t>11</a:t>
-            </a:fld>
-            <a:endParaRPr lang="fr-BE"/>
-          </a:p>
-        </p:txBody>
-      </p:sp>
-    </p:spTree>
-    <p:extLst>
-      <p:ext uri="{BB962C8B-B14F-4D97-AF65-F5344CB8AC3E}">
-        <p14:creationId xmlns:p14="http://schemas.microsoft.com/office/powerpoint/2010/main" val="3145874301"/>
-      </p:ext>
-    </p:extLst>
-  </p:cSld>
-  <p:clrMapOvr>
-    <a:masterClrMapping/>
-  </p:clrMapOvr>
-</p:sld>
-</file>
-
 <file path=ppt/slides/slide12.xml><?xml version="1.0" encoding="utf-8"?>
 <p:sld xmlns:a="http://schemas.openxmlformats.org/drawingml/2006/main" xmlns:r="http://schemas.openxmlformats.org/officeDocument/2006/relationships" xmlns:p="http://schemas.openxmlformats.org/presentationml/2006/main">
   <p:cSld>
@@ -8642,7 +8659,7 @@
           <p:cNvPr id="2" name="Titre 1">
             <a:extLst>
               <a:ext uri="{FF2B5EF4-FFF2-40B4-BE49-F238E27FC236}">
-                <a16:creationId xmlns:a16="http://schemas.microsoft.com/office/drawing/2014/main" id="{46C634C0-9572-4976-A098-7D7FEE55D519}"/>
+                <a16:creationId xmlns:a16="http://schemas.microsoft.com/office/drawing/2014/main" id="{E7253B32-417E-4C48-918C-CE54FDF90181}"/>
               </a:ext>
             </a:extLst>
           </p:cNvPr>
@@ -8660,7 +8677,7 @@
           <a:p>
             <a:r>
               <a:rPr lang="fr-BE" dirty="0"/>
-              <a:t>Exercice 2</a:t>
+              <a:t>Exercice 1</a:t>
             </a:r>
           </a:p>
         </p:txBody>
@@ -8670,7 +8687,7 @@
           <p:cNvPr id="3" name="Espace réservé du contenu 2">
             <a:extLst>
               <a:ext uri="{FF2B5EF4-FFF2-40B4-BE49-F238E27FC236}">
-                <a16:creationId xmlns:a16="http://schemas.microsoft.com/office/drawing/2014/main" id="{AB687D2F-A2CD-4AF6-B076-65D05AA934C0}"/>
+                <a16:creationId xmlns:a16="http://schemas.microsoft.com/office/drawing/2014/main" id="{C190E0AF-5E1E-48CB-861F-7CA9A2AD777B}"/>
               </a:ext>
             </a:extLst>
           </p:cNvPr>
@@ -8688,7 +8705,7 @@
           <a:p>
             <a:r>
               <a:rPr lang="fr-BE" dirty="0"/>
-              <a:t>Afficher un message sur la console</a:t>
+              <a:t>Faire clignoter la LED</a:t>
             </a:r>
           </a:p>
         </p:txBody>
@@ -8698,7 +8715,7 @@
           <p:cNvPr id="5" name="Espace réservé du numéro de diapositive 4">
             <a:extLst>
               <a:ext uri="{FF2B5EF4-FFF2-40B4-BE49-F238E27FC236}">
-                <a16:creationId xmlns:a16="http://schemas.microsoft.com/office/drawing/2014/main" id="{1376EC85-1025-4B01-98B2-C2A358713579}"/>
+                <a16:creationId xmlns:a16="http://schemas.microsoft.com/office/drawing/2014/main" id="{95A66774-C3BB-4F2A-ABE4-88A87D52382F}"/>
               </a:ext>
             </a:extLst>
           </p:cNvPr>
@@ -8725,7 +8742,7 @@
     </p:spTree>
     <p:extLst>
       <p:ext uri="{BB962C8B-B14F-4D97-AF65-F5344CB8AC3E}">
-        <p14:creationId xmlns:p14="http://schemas.microsoft.com/office/powerpoint/2010/main" val="3215653391"/>
+        <p14:creationId xmlns:p14="http://schemas.microsoft.com/office/powerpoint/2010/main" val="3145874301"/>
       </p:ext>
     </p:extLst>
   </p:cSld>
@@ -8757,6 +8774,121 @@
           <p:cNvPr id="2" name="Titre 1">
             <a:extLst>
               <a:ext uri="{FF2B5EF4-FFF2-40B4-BE49-F238E27FC236}">
+                <a16:creationId xmlns:a16="http://schemas.microsoft.com/office/drawing/2014/main" id="{46C634C0-9572-4976-A098-7D7FEE55D519}"/>
+              </a:ext>
+            </a:extLst>
+          </p:cNvPr>
+          <p:cNvSpPr>
+            <a:spLocks noGrp="1"/>
+          </p:cNvSpPr>
+          <p:nvPr>
+            <p:ph type="title"/>
+          </p:nvPr>
+        </p:nvSpPr>
+        <p:spPr/>
+        <p:txBody>
+          <a:bodyPr/>
+          <a:lstStyle/>
+          <a:p>
+            <a:r>
+              <a:rPr lang="fr-BE" dirty="0"/>
+              <a:t>Exercice 2</a:t>
+            </a:r>
+          </a:p>
+        </p:txBody>
+      </p:sp>
+      <p:sp>
+        <p:nvSpPr>
+          <p:cNvPr id="3" name="Espace réservé du contenu 2">
+            <a:extLst>
+              <a:ext uri="{FF2B5EF4-FFF2-40B4-BE49-F238E27FC236}">
+                <a16:creationId xmlns:a16="http://schemas.microsoft.com/office/drawing/2014/main" id="{AB687D2F-A2CD-4AF6-B076-65D05AA934C0}"/>
+              </a:ext>
+            </a:extLst>
+          </p:cNvPr>
+          <p:cNvSpPr>
+            <a:spLocks noGrp="1"/>
+          </p:cNvSpPr>
+          <p:nvPr>
+            <p:ph idx="1"/>
+          </p:nvPr>
+        </p:nvSpPr>
+        <p:spPr/>
+        <p:txBody>
+          <a:bodyPr/>
+          <a:lstStyle/>
+          <a:p>
+            <a:r>
+              <a:rPr lang="fr-BE" dirty="0"/>
+              <a:t>Afficher un message sur la console</a:t>
+            </a:r>
+          </a:p>
+        </p:txBody>
+      </p:sp>
+      <p:sp>
+        <p:nvSpPr>
+          <p:cNvPr id="5" name="Espace réservé du numéro de diapositive 4">
+            <a:extLst>
+              <a:ext uri="{FF2B5EF4-FFF2-40B4-BE49-F238E27FC236}">
+                <a16:creationId xmlns:a16="http://schemas.microsoft.com/office/drawing/2014/main" id="{1376EC85-1025-4B01-98B2-C2A358713579}"/>
+              </a:ext>
+            </a:extLst>
+          </p:cNvPr>
+          <p:cNvSpPr>
+            <a:spLocks noGrp="1"/>
+          </p:cNvSpPr>
+          <p:nvPr>
+            <p:ph type="sldNum" sz="quarter" idx="12"/>
+          </p:nvPr>
+        </p:nvSpPr>
+        <p:spPr/>
+        <p:txBody>
+          <a:bodyPr/>
+          <a:lstStyle/>
+          <a:p>
+            <a:fld id="{7D3627B9-1F90-4568-B521-4CB3E5CC102E}" type="slidenum">
+              <a:rPr lang="fr-BE" smtClean="0"/>
+              <a:t>13</a:t>
+            </a:fld>
+            <a:endParaRPr lang="fr-BE"/>
+          </a:p>
+        </p:txBody>
+      </p:sp>
+    </p:spTree>
+    <p:extLst>
+      <p:ext uri="{BB962C8B-B14F-4D97-AF65-F5344CB8AC3E}">
+        <p14:creationId xmlns:p14="http://schemas.microsoft.com/office/powerpoint/2010/main" val="3215653391"/>
+      </p:ext>
+    </p:extLst>
+  </p:cSld>
+  <p:clrMapOvr>
+    <a:masterClrMapping/>
+  </p:clrMapOvr>
+</p:sld>
+</file>
+
+<file path=ppt/slides/slide14.xml><?xml version="1.0" encoding="utf-8"?>
+<p:sld xmlns:a="http://schemas.openxmlformats.org/drawingml/2006/main" xmlns:r="http://schemas.openxmlformats.org/officeDocument/2006/relationships" xmlns:p="http://schemas.openxmlformats.org/presentationml/2006/main">
+  <p:cSld>
+    <p:spTree>
+      <p:nvGrpSpPr>
+        <p:cNvPr id="1" name=""/>
+        <p:cNvGrpSpPr/>
+        <p:nvPr/>
+      </p:nvGrpSpPr>
+      <p:grpSpPr>
+        <a:xfrm>
+          <a:off x="0" y="0"/>
+          <a:ext cx="0" cy="0"/>
+          <a:chOff x="0" y="0"/>
+          <a:chExt cx="0" cy="0"/>
+        </a:xfrm>
+      </p:grpSpPr>
+      <p:sp>
+        <p:nvSpPr>
+          <p:cNvPr id="2" name="Titre 1">
+            <a:extLst>
+              <a:ext uri="{FF2B5EF4-FFF2-40B4-BE49-F238E27FC236}">
                 <a16:creationId xmlns:a16="http://schemas.microsoft.com/office/drawing/2014/main" id="{CF7E30A0-B290-4E16-B467-D53A1A0D8E6B}"/>
               </a:ext>
             </a:extLst>
@@ -8831,7 +8963,7 @@
           <a:p>
             <a:fld id="{7D3627B9-1F90-4568-B521-4CB3E5CC102E}" type="slidenum">
               <a:rPr lang="fr-BE" smtClean="0"/>
-              <a:t>13</a:t>
+              <a:t>14</a:t>
             </a:fld>
             <a:endParaRPr lang="fr-BE"/>
           </a:p>
@@ -8850,7 +8982,7 @@
 </p:sld>
 </file>
 
-<file path=ppt/slides/slide14.xml><?xml version="1.0" encoding="utf-8"?>
+<file path=ppt/slides/slide15.xml><?xml version="1.0" encoding="utf-8"?>
 <p:sld xmlns:a="http://schemas.openxmlformats.org/drawingml/2006/main" xmlns:r="http://schemas.openxmlformats.org/officeDocument/2006/relationships" xmlns:p="http://schemas.openxmlformats.org/presentationml/2006/main">
   <p:cSld>
     <p:bg>
@@ -9153,7 +9285,7 @@
           <a:p>
             <a:fld id="{7D3627B9-1F90-4568-B521-4CB3E5CC102E}" type="slidenum">
               <a:rPr lang="fr-BE" smtClean="0"/>
-              <a:t>14</a:t>
+              <a:t>15</a:t>
             </a:fld>
             <a:endParaRPr lang="fr-BE"/>
           </a:p>
@@ -9172,7 +9304,7 @@
 </p:sld>
 </file>
 
-<file path=ppt/slides/slide15.xml><?xml version="1.0" encoding="utf-8"?>
+<file path=ppt/slides/slide16.xml><?xml version="1.0" encoding="utf-8"?>
 <p:sld xmlns:a="http://schemas.openxmlformats.org/drawingml/2006/main" xmlns:r="http://schemas.openxmlformats.org/officeDocument/2006/relationships" xmlns:p="http://schemas.openxmlformats.org/presentationml/2006/main">
   <p:cSld>
     <p:spTree>
@@ -9344,7 +9476,7 @@
           <a:p>
             <a:fld id="{7D3627B9-1F90-4568-B521-4CB3E5CC102E}" type="slidenum">
               <a:rPr lang="fr-BE" smtClean="0"/>
-              <a:t>15</a:t>
+              <a:t>16</a:t>
             </a:fld>
             <a:endParaRPr lang="fr-BE"/>
           </a:p>
@@ -9363,7 +9495,7 @@
 </p:sld>
 </file>
 
-<file path=ppt/slides/slide16.xml><?xml version="1.0" encoding="utf-8"?>
+<file path=ppt/slides/slide17.xml><?xml version="1.0" encoding="utf-8"?>
 <p:sld xmlns:a="http://schemas.openxmlformats.org/drawingml/2006/main" xmlns:r="http://schemas.openxmlformats.org/officeDocument/2006/relationships" xmlns:p="http://schemas.openxmlformats.org/presentationml/2006/main">
   <p:cSld>
     <p:spTree>
@@ -9579,7 +9711,7 @@
           <a:p>
             <a:fld id="{7D3627B9-1F90-4568-B521-4CB3E5CC102E}" type="slidenum">
               <a:rPr lang="fr-BE" smtClean="0"/>
-              <a:t>16</a:t>
+              <a:t>17</a:t>
             </a:fld>
             <a:endParaRPr lang="fr-BE"/>
           </a:p>
@@ -9738,7 +9870,7 @@
 </p:sld>
 </file>
 
-<file path=ppt/slides/slide17.xml><?xml version="1.0" encoding="utf-8"?>
+<file path=ppt/slides/slide18.xml><?xml version="1.0" encoding="utf-8"?>
 <p:sld xmlns:a="http://schemas.openxmlformats.org/drawingml/2006/main" xmlns:r="http://schemas.openxmlformats.org/officeDocument/2006/relationships" xmlns:p="http://schemas.openxmlformats.org/presentationml/2006/main">
   <p:cSld>
     <p:spTree>
@@ -9890,7 +10022,7 @@
           <a:p>
             <a:fld id="{7D3627B9-1F90-4568-B521-4CB3E5CC102E}" type="slidenum">
               <a:rPr lang="fr-BE" smtClean="0"/>
-              <a:t>17</a:t>
+              <a:t>18</a:t>
             </a:fld>
             <a:endParaRPr lang="fr-BE"/>
           </a:p>
@@ -9995,121 +10127,6 @@
 </p:sld>
 </file>
 
-<file path=ppt/slides/slide18.xml><?xml version="1.0" encoding="utf-8"?>
-<p:sld xmlns:a="http://schemas.openxmlformats.org/drawingml/2006/main" xmlns:r="http://schemas.openxmlformats.org/officeDocument/2006/relationships" xmlns:p="http://schemas.openxmlformats.org/presentationml/2006/main">
-  <p:cSld>
-    <p:spTree>
-      <p:nvGrpSpPr>
-        <p:cNvPr id="1" name=""/>
-        <p:cNvGrpSpPr/>
-        <p:nvPr/>
-      </p:nvGrpSpPr>
-      <p:grpSpPr>
-        <a:xfrm>
-          <a:off x="0" y="0"/>
-          <a:ext cx="0" cy="0"/>
-          <a:chOff x="0" y="0"/>
-          <a:chExt cx="0" cy="0"/>
-        </a:xfrm>
-      </p:grpSpPr>
-      <p:sp>
-        <p:nvSpPr>
-          <p:cNvPr id="2" name="Titre 1">
-            <a:extLst>
-              <a:ext uri="{FF2B5EF4-FFF2-40B4-BE49-F238E27FC236}">
-                <a16:creationId xmlns:a16="http://schemas.microsoft.com/office/drawing/2014/main" id="{CF7E30A0-B290-4E16-B467-D53A1A0D8E6B}"/>
-              </a:ext>
-            </a:extLst>
-          </p:cNvPr>
-          <p:cNvSpPr>
-            <a:spLocks noGrp="1"/>
-          </p:cNvSpPr>
-          <p:nvPr>
-            <p:ph type="title"/>
-          </p:nvPr>
-        </p:nvSpPr>
-        <p:spPr/>
-        <p:txBody>
-          <a:bodyPr/>
-          <a:lstStyle/>
-          <a:p>
-            <a:r>
-              <a:rPr lang="fr-BE" dirty="0"/>
-              <a:t>Exercice 3</a:t>
-            </a:r>
-          </a:p>
-        </p:txBody>
-      </p:sp>
-      <p:sp>
-        <p:nvSpPr>
-          <p:cNvPr id="3" name="Espace réservé du contenu 2">
-            <a:extLst>
-              <a:ext uri="{FF2B5EF4-FFF2-40B4-BE49-F238E27FC236}">
-                <a16:creationId xmlns:a16="http://schemas.microsoft.com/office/drawing/2014/main" id="{561712A7-9091-4977-BA95-BC39AB981D90}"/>
-              </a:ext>
-            </a:extLst>
-          </p:cNvPr>
-          <p:cNvSpPr>
-            <a:spLocks noGrp="1"/>
-          </p:cNvSpPr>
-          <p:nvPr>
-            <p:ph idx="1"/>
-          </p:nvPr>
-        </p:nvSpPr>
-        <p:spPr/>
-        <p:txBody>
-          <a:bodyPr/>
-          <a:lstStyle/>
-          <a:p>
-            <a:r>
-              <a:rPr lang="fr-BE" dirty="0"/>
-              <a:t>Calibrer le servomoteur</a:t>
-            </a:r>
-          </a:p>
-        </p:txBody>
-      </p:sp>
-      <p:sp>
-        <p:nvSpPr>
-          <p:cNvPr id="5" name="Espace réservé du numéro de diapositive 4">
-            <a:extLst>
-              <a:ext uri="{FF2B5EF4-FFF2-40B4-BE49-F238E27FC236}">
-                <a16:creationId xmlns:a16="http://schemas.microsoft.com/office/drawing/2014/main" id="{F898B870-352E-43C7-90E9-B4271F6D478E}"/>
-              </a:ext>
-            </a:extLst>
-          </p:cNvPr>
-          <p:cNvSpPr>
-            <a:spLocks noGrp="1"/>
-          </p:cNvSpPr>
-          <p:nvPr>
-            <p:ph type="sldNum" sz="quarter" idx="12"/>
-          </p:nvPr>
-        </p:nvSpPr>
-        <p:spPr/>
-        <p:txBody>
-          <a:bodyPr/>
-          <a:lstStyle/>
-          <a:p>
-            <a:fld id="{7D3627B9-1F90-4568-B521-4CB3E5CC102E}" type="slidenum">
-              <a:rPr lang="fr-BE" smtClean="0"/>
-              <a:t>18</a:t>
-            </a:fld>
-            <a:endParaRPr lang="fr-BE"/>
-          </a:p>
-        </p:txBody>
-      </p:sp>
-    </p:spTree>
-    <p:extLst>
-      <p:ext uri="{BB962C8B-B14F-4D97-AF65-F5344CB8AC3E}">
-        <p14:creationId xmlns:p14="http://schemas.microsoft.com/office/powerpoint/2010/main" val="2974726621"/>
-      </p:ext>
-    </p:extLst>
-  </p:cSld>
-  <p:clrMapOvr>
-    <a:masterClrMapping/>
-  </p:clrMapOvr>
-</p:sld>
-</file>
-
 <file path=ppt/slides/slide19.xml><?xml version="1.0" encoding="utf-8"?>
 <p:sld xmlns:a="http://schemas.openxmlformats.org/drawingml/2006/main" xmlns:r="http://schemas.openxmlformats.org/officeDocument/2006/relationships" xmlns:p="http://schemas.openxmlformats.org/presentationml/2006/main">
   <p:cSld>
@@ -10132,7 +10149,7 @@
           <p:cNvPr id="2" name="Titre 1">
             <a:extLst>
               <a:ext uri="{FF2B5EF4-FFF2-40B4-BE49-F238E27FC236}">
-                <a16:creationId xmlns:a16="http://schemas.microsoft.com/office/drawing/2014/main" id="{ED53924C-752C-48BC-922C-49FC0354DC17}"/>
+                <a16:creationId xmlns:a16="http://schemas.microsoft.com/office/drawing/2014/main" id="{CF7E30A0-B290-4E16-B467-D53A1A0D8E6B}"/>
               </a:ext>
             </a:extLst>
           </p:cNvPr>
@@ -10150,7 +10167,7 @@
           <a:p>
             <a:r>
               <a:rPr lang="fr-BE" dirty="0"/>
-              <a:t>Exercice 4</a:t>
+              <a:t>Exercice 3</a:t>
             </a:r>
           </a:p>
         </p:txBody>
@@ -10160,7 +10177,7 @@
           <p:cNvPr id="3" name="Espace réservé du contenu 2">
             <a:extLst>
               <a:ext uri="{FF2B5EF4-FFF2-40B4-BE49-F238E27FC236}">
-                <a16:creationId xmlns:a16="http://schemas.microsoft.com/office/drawing/2014/main" id="{B2D9B98B-E330-4BD5-8FDF-A261E12E526B}"/>
+                <a16:creationId xmlns:a16="http://schemas.microsoft.com/office/drawing/2014/main" id="{561712A7-9091-4977-BA95-BC39AB981D90}"/>
               </a:ext>
             </a:extLst>
           </p:cNvPr>
@@ -10178,7 +10195,7 @@
           <a:p>
             <a:r>
               <a:rPr lang="fr-BE" dirty="0"/>
-              <a:t>Envoyer l’angle souhaité au servomoteur</a:t>
+              <a:t>Calibrer le servomoteur</a:t>
             </a:r>
           </a:p>
         </p:txBody>
@@ -10188,7 +10205,7 @@
           <p:cNvPr id="5" name="Espace réservé du numéro de diapositive 4">
             <a:extLst>
               <a:ext uri="{FF2B5EF4-FFF2-40B4-BE49-F238E27FC236}">
-                <a16:creationId xmlns:a16="http://schemas.microsoft.com/office/drawing/2014/main" id="{EC4AF2FD-F567-479A-B41A-CFFD3219684D}"/>
+                <a16:creationId xmlns:a16="http://schemas.microsoft.com/office/drawing/2014/main" id="{F898B870-352E-43C7-90E9-B4271F6D478E}"/>
               </a:ext>
             </a:extLst>
           </p:cNvPr>
@@ -10215,7 +10232,7 @@
     </p:spTree>
     <p:extLst>
       <p:ext uri="{BB962C8B-B14F-4D97-AF65-F5344CB8AC3E}">
-        <p14:creationId xmlns:p14="http://schemas.microsoft.com/office/powerpoint/2010/main" val="958880033"/>
+        <p14:creationId xmlns:p14="http://schemas.microsoft.com/office/powerpoint/2010/main" val="2974726621"/>
       </p:ext>
     </p:extLst>
   </p:cSld>
@@ -10399,6 +10416,121 @@
 </file>
 
 <file path=ppt/slides/slide20.xml><?xml version="1.0" encoding="utf-8"?>
+<p:sld xmlns:a="http://schemas.openxmlformats.org/drawingml/2006/main" xmlns:r="http://schemas.openxmlformats.org/officeDocument/2006/relationships" xmlns:p="http://schemas.openxmlformats.org/presentationml/2006/main">
+  <p:cSld>
+    <p:spTree>
+      <p:nvGrpSpPr>
+        <p:cNvPr id="1" name=""/>
+        <p:cNvGrpSpPr/>
+        <p:nvPr/>
+      </p:nvGrpSpPr>
+      <p:grpSpPr>
+        <a:xfrm>
+          <a:off x="0" y="0"/>
+          <a:ext cx="0" cy="0"/>
+          <a:chOff x="0" y="0"/>
+          <a:chExt cx="0" cy="0"/>
+        </a:xfrm>
+      </p:grpSpPr>
+      <p:sp>
+        <p:nvSpPr>
+          <p:cNvPr id="2" name="Titre 1">
+            <a:extLst>
+              <a:ext uri="{FF2B5EF4-FFF2-40B4-BE49-F238E27FC236}">
+                <a16:creationId xmlns:a16="http://schemas.microsoft.com/office/drawing/2014/main" id="{ED53924C-752C-48BC-922C-49FC0354DC17}"/>
+              </a:ext>
+            </a:extLst>
+          </p:cNvPr>
+          <p:cNvSpPr>
+            <a:spLocks noGrp="1"/>
+          </p:cNvSpPr>
+          <p:nvPr>
+            <p:ph type="title"/>
+          </p:nvPr>
+        </p:nvSpPr>
+        <p:spPr/>
+        <p:txBody>
+          <a:bodyPr/>
+          <a:lstStyle/>
+          <a:p>
+            <a:r>
+              <a:rPr lang="fr-BE" dirty="0"/>
+              <a:t>Exercice 4</a:t>
+            </a:r>
+          </a:p>
+        </p:txBody>
+      </p:sp>
+      <p:sp>
+        <p:nvSpPr>
+          <p:cNvPr id="3" name="Espace réservé du contenu 2">
+            <a:extLst>
+              <a:ext uri="{FF2B5EF4-FFF2-40B4-BE49-F238E27FC236}">
+                <a16:creationId xmlns:a16="http://schemas.microsoft.com/office/drawing/2014/main" id="{B2D9B98B-E330-4BD5-8FDF-A261E12E526B}"/>
+              </a:ext>
+            </a:extLst>
+          </p:cNvPr>
+          <p:cNvSpPr>
+            <a:spLocks noGrp="1"/>
+          </p:cNvSpPr>
+          <p:nvPr>
+            <p:ph idx="1"/>
+          </p:nvPr>
+        </p:nvSpPr>
+        <p:spPr/>
+        <p:txBody>
+          <a:bodyPr/>
+          <a:lstStyle/>
+          <a:p>
+            <a:r>
+              <a:rPr lang="fr-BE" dirty="0"/>
+              <a:t>Envoyer l’angle souhaité au servomoteur</a:t>
+            </a:r>
+          </a:p>
+        </p:txBody>
+      </p:sp>
+      <p:sp>
+        <p:nvSpPr>
+          <p:cNvPr id="5" name="Espace réservé du numéro de diapositive 4">
+            <a:extLst>
+              <a:ext uri="{FF2B5EF4-FFF2-40B4-BE49-F238E27FC236}">
+                <a16:creationId xmlns:a16="http://schemas.microsoft.com/office/drawing/2014/main" id="{EC4AF2FD-F567-479A-B41A-CFFD3219684D}"/>
+              </a:ext>
+            </a:extLst>
+          </p:cNvPr>
+          <p:cNvSpPr>
+            <a:spLocks noGrp="1"/>
+          </p:cNvSpPr>
+          <p:nvPr>
+            <p:ph type="sldNum" sz="quarter" idx="12"/>
+          </p:nvPr>
+        </p:nvSpPr>
+        <p:spPr/>
+        <p:txBody>
+          <a:bodyPr/>
+          <a:lstStyle/>
+          <a:p>
+            <a:fld id="{7D3627B9-1F90-4568-B521-4CB3E5CC102E}" type="slidenum">
+              <a:rPr lang="fr-BE" smtClean="0"/>
+              <a:t>20</a:t>
+            </a:fld>
+            <a:endParaRPr lang="fr-BE"/>
+          </a:p>
+        </p:txBody>
+      </p:sp>
+    </p:spTree>
+    <p:extLst>
+      <p:ext uri="{BB962C8B-B14F-4D97-AF65-F5344CB8AC3E}">
+        <p14:creationId xmlns:p14="http://schemas.microsoft.com/office/powerpoint/2010/main" val="958880033"/>
+      </p:ext>
+    </p:extLst>
+  </p:cSld>
+  <p:clrMapOvr>
+    <a:masterClrMapping/>
+  </p:clrMapOvr>
+</p:sld>
+</file>
+
+<file path=ppt/slides/slide21.xml><?xml version="1.0" encoding="utf-8"?>
 <p:sld xmlns:a="http://schemas.openxmlformats.org/drawingml/2006/main" xmlns:r="http://schemas.openxmlformats.org/officeDocument/2006/relationships" xmlns:p="http://schemas.openxmlformats.org/presentationml/2006/main">
   <p:cSld>
     <p:bg>
@@ -10723,7 +10855,7 @@
           <a:p>
             <a:fld id="{7D3627B9-1F90-4568-B521-4CB3E5CC102E}" type="slidenum">
               <a:rPr lang="fr-BE" smtClean="0"/>
-              <a:t>20</a:t>
+              <a:t>21</a:t>
             </a:fld>
             <a:endParaRPr lang="fr-BE"/>
           </a:p>
@@ -10742,7 +10874,7 @@
 </p:sld>
 </file>
 
-<file path=ppt/slides/slide21.xml><?xml version="1.0" encoding="utf-8"?>
+<file path=ppt/slides/slide22.xml><?xml version="1.0" encoding="utf-8"?>
 <p:sld xmlns:a="http://schemas.openxmlformats.org/drawingml/2006/main" xmlns:r="http://schemas.openxmlformats.org/officeDocument/2006/relationships" xmlns:p="http://schemas.openxmlformats.org/presentationml/2006/main">
   <p:cSld>
     <p:bg>
@@ -10852,7 +10984,7 @@
             <a:fld id="{7D3627B9-1F90-4568-B521-4CB3E5CC102E}" type="slidenum">
               <a:rPr lang="en-US" smtClean="0"/>
               <a:pPr/>
-              <a:t>21</a:t>
+              <a:t>22</a:t>
             </a:fld>
             <a:endParaRPr lang="en-US"/>
           </a:p>
@@ -10918,7 +11050,7 @@
 </p:sld>
 </file>
 
-<file path=ppt/slides/slide22.xml><?xml version="1.0" encoding="utf-8"?>
+<file path=ppt/slides/slide23.xml><?xml version="1.0" encoding="utf-8"?>
 <p:sld xmlns:a="http://schemas.openxmlformats.org/drawingml/2006/main" xmlns:r="http://schemas.openxmlformats.org/officeDocument/2006/relationships" xmlns:p="http://schemas.openxmlformats.org/presentationml/2006/main">
   <p:cSld>
     <p:spTree>
@@ -10987,7 +11119,7 @@
             <a:fld id="{7D3627B9-1F90-4568-B521-4CB3E5CC102E}" type="slidenum">
               <a:rPr lang="fr-BE" smtClean="0"/>
               <a:pPr/>
-              <a:t>22</a:t>
+              <a:t>23</a:t>
             </a:fld>
             <a:endParaRPr lang="fr-BE"/>
           </a:p>
@@ -11720,7 +11852,7 @@
 </p:sld>
 </file>
 
-<file path=ppt/slides/slide23.xml><?xml version="1.0" encoding="utf-8"?>
+<file path=ppt/slides/slide24.xml><?xml version="1.0" encoding="utf-8"?>
 <p:sld xmlns:a="http://schemas.openxmlformats.org/drawingml/2006/main" xmlns:r="http://schemas.openxmlformats.org/officeDocument/2006/relationships" xmlns:p="http://schemas.openxmlformats.org/presentationml/2006/main">
   <p:cSld>
     <p:spTree>
@@ -11760,7 +11892,7 @@
           <a:p>
             <a:fld id="{7D3627B9-1F90-4568-B521-4CB3E5CC102E}" type="slidenum">
               <a:rPr lang="fr-BE" smtClean="0"/>
-              <a:t>23</a:t>
+              <a:t>24</a:t>
             </a:fld>
             <a:endParaRPr lang="fr-BE"/>
           </a:p>
@@ -12099,7 +12231,7 @@
 </p:sld>
 </file>
 
-<file path=ppt/slides/slide24.xml><?xml version="1.0" encoding="utf-8"?>
+<file path=ppt/slides/slide25.xml><?xml version="1.0" encoding="utf-8"?>
 <p:sld xmlns:a="http://schemas.openxmlformats.org/drawingml/2006/main" xmlns:r="http://schemas.openxmlformats.org/officeDocument/2006/relationships" xmlns:p="http://schemas.openxmlformats.org/presentationml/2006/main">
   <p:cSld>
     <p:spTree>
@@ -12139,7 +12271,7 @@
           <a:p>
             <a:fld id="{7D3627B9-1F90-4568-B521-4CB3E5CC102E}" type="slidenum">
               <a:rPr lang="fr-BE" smtClean="0"/>
-              <a:t>24</a:t>
+              <a:t>25</a:t>
             </a:fld>
             <a:endParaRPr lang="fr-BE"/>
           </a:p>
@@ -12674,129 +12806,6 @@
 </p:sld>
 </file>
 
-<file path=ppt/slides/slide25.xml><?xml version="1.0" encoding="utf-8"?>
-<p:sld xmlns:a="http://schemas.openxmlformats.org/drawingml/2006/main" xmlns:r="http://schemas.openxmlformats.org/officeDocument/2006/relationships" xmlns:p="http://schemas.openxmlformats.org/presentationml/2006/main">
-  <p:cSld>
-    <p:spTree>
-      <p:nvGrpSpPr>
-        <p:cNvPr id="1" name=""/>
-        <p:cNvGrpSpPr/>
-        <p:nvPr/>
-      </p:nvGrpSpPr>
-      <p:grpSpPr>
-        <a:xfrm>
-          <a:off x="0" y="0"/>
-          <a:ext cx="0" cy="0"/>
-          <a:chOff x="0" y="0"/>
-          <a:chExt cx="0" cy="0"/>
-        </a:xfrm>
-      </p:grpSpPr>
-      <p:sp>
-        <p:nvSpPr>
-          <p:cNvPr id="2" name="Titre 1">
-            <a:extLst>
-              <a:ext uri="{FF2B5EF4-FFF2-40B4-BE49-F238E27FC236}">
-                <a16:creationId xmlns:a16="http://schemas.microsoft.com/office/drawing/2014/main" id="{46DB43F5-9381-4300-817E-49CE48E3C137}"/>
-              </a:ext>
-            </a:extLst>
-          </p:cNvPr>
-          <p:cNvSpPr>
-            <a:spLocks noGrp="1"/>
-          </p:cNvSpPr>
-          <p:nvPr>
-            <p:ph type="title"/>
-          </p:nvPr>
-        </p:nvSpPr>
-        <p:spPr/>
-        <p:txBody>
-          <a:bodyPr/>
-          <a:lstStyle/>
-          <a:p>
-            <a:r>
-              <a:rPr lang="fr-BE" dirty="0"/>
-              <a:t>Exercice 5</a:t>
-            </a:r>
-          </a:p>
-        </p:txBody>
-      </p:sp>
-      <p:sp>
-        <p:nvSpPr>
-          <p:cNvPr id="3" name="Espace réservé du contenu 2">
-            <a:extLst>
-              <a:ext uri="{FF2B5EF4-FFF2-40B4-BE49-F238E27FC236}">
-                <a16:creationId xmlns:a16="http://schemas.microsoft.com/office/drawing/2014/main" id="{AF426914-CE4A-4748-932A-AA8BA86C8906}"/>
-              </a:ext>
-            </a:extLst>
-          </p:cNvPr>
-          <p:cNvSpPr>
-            <a:spLocks noGrp="1"/>
-          </p:cNvSpPr>
-          <p:nvPr>
-            <p:ph idx="1"/>
-          </p:nvPr>
-        </p:nvSpPr>
-        <p:spPr/>
-        <p:txBody>
-          <a:bodyPr/>
-          <a:lstStyle/>
-          <a:p>
-            <a:r>
-              <a:rPr lang="fr-BE" dirty="0"/>
-              <a:t>Se connecter au </a:t>
-            </a:r>
-            <a:r>
-              <a:rPr lang="fr-BE" dirty="0" err="1"/>
-              <a:t>WiFi</a:t>
-            </a:r>
-            <a:r>
-              <a:rPr lang="fr-BE" dirty="0"/>
-              <a:t> et afficher l’adresse IP</a:t>
-            </a:r>
-          </a:p>
-        </p:txBody>
-      </p:sp>
-      <p:sp>
-        <p:nvSpPr>
-          <p:cNvPr id="5" name="Espace réservé du numéro de diapositive 4">
-            <a:extLst>
-              <a:ext uri="{FF2B5EF4-FFF2-40B4-BE49-F238E27FC236}">
-                <a16:creationId xmlns:a16="http://schemas.microsoft.com/office/drawing/2014/main" id="{9A74F923-0830-492D-8CFB-E00B65C2B701}"/>
-              </a:ext>
-            </a:extLst>
-          </p:cNvPr>
-          <p:cNvSpPr>
-            <a:spLocks noGrp="1"/>
-          </p:cNvSpPr>
-          <p:nvPr>
-            <p:ph type="sldNum" sz="quarter" idx="12"/>
-          </p:nvPr>
-        </p:nvSpPr>
-        <p:spPr/>
-        <p:txBody>
-          <a:bodyPr/>
-          <a:lstStyle/>
-          <a:p>
-            <a:fld id="{7D3627B9-1F90-4568-B521-4CB3E5CC102E}" type="slidenum">
-              <a:rPr lang="fr-BE" smtClean="0"/>
-              <a:t>25</a:t>
-            </a:fld>
-            <a:endParaRPr lang="fr-BE"/>
-          </a:p>
-        </p:txBody>
-      </p:sp>
-    </p:spTree>
-    <p:extLst>
-      <p:ext uri="{BB962C8B-B14F-4D97-AF65-F5344CB8AC3E}">
-        <p14:creationId xmlns:p14="http://schemas.microsoft.com/office/powerpoint/2010/main" val="2134143814"/>
-      </p:ext>
-    </p:extLst>
-  </p:cSld>
-  <p:clrMapOvr>
-    <a:masterClrMapping/>
-  </p:clrMapOvr>
-</p:sld>
-</file>
-
 <file path=ppt/slides/slide26.xml><?xml version="1.0" encoding="utf-8"?>
 <p:sld xmlns:a="http://schemas.openxmlformats.org/drawingml/2006/main" xmlns:r="http://schemas.openxmlformats.org/officeDocument/2006/relationships" xmlns:p="http://schemas.openxmlformats.org/presentationml/2006/main">
   <p:cSld>
@@ -12819,7 +12828,7 @@
           <p:cNvPr id="2" name="Titre 1">
             <a:extLst>
               <a:ext uri="{FF2B5EF4-FFF2-40B4-BE49-F238E27FC236}">
-                <a16:creationId xmlns:a16="http://schemas.microsoft.com/office/drawing/2014/main" id="{8FF24F8E-356C-4CC3-BC1E-183A9E686F01}"/>
+                <a16:creationId xmlns:a16="http://schemas.microsoft.com/office/drawing/2014/main" id="{46DB43F5-9381-4300-817E-49CE48E3C137}"/>
               </a:ext>
             </a:extLst>
           </p:cNvPr>
@@ -12837,7 +12846,7 @@
           <a:p>
             <a:r>
               <a:rPr lang="fr-BE" dirty="0"/>
-              <a:t>Exercice 6</a:t>
+              <a:t>Exercice 5</a:t>
             </a:r>
           </a:p>
         </p:txBody>
@@ -12847,7 +12856,7 @@
           <p:cNvPr id="3" name="Espace réservé du contenu 2">
             <a:extLst>
               <a:ext uri="{FF2B5EF4-FFF2-40B4-BE49-F238E27FC236}">
-                <a16:creationId xmlns:a16="http://schemas.microsoft.com/office/drawing/2014/main" id="{9EBC696B-CBBE-40F0-942D-93CF2E900B7C}"/>
+                <a16:creationId xmlns:a16="http://schemas.microsoft.com/office/drawing/2014/main" id="{AF426914-CE4A-4748-932A-AA8BA86C8906}"/>
               </a:ext>
             </a:extLst>
           </p:cNvPr>
@@ -12865,7 +12874,15 @@
           <a:p>
             <a:r>
               <a:rPr lang="fr-BE" dirty="0"/>
-              <a:t>Envoyer une information vers un serveur</a:t>
+              <a:t>Se connecter au </a:t>
+            </a:r>
+            <a:r>
+              <a:rPr lang="fr-BE" dirty="0" err="1"/>
+              <a:t>WiFi</a:t>
+            </a:r>
+            <a:r>
+              <a:rPr lang="fr-BE" dirty="0"/>
+              <a:t> et afficher l’adresse IP</a:t>
             </a:r>
           </a:p>
         </p:txBody>
@@ -12875,7 +12892,7 @@
           <p:cNvPr id="5" name="Espace réservé du numéro de diapositive 4">
             <a:extLst>
               <a:ext uri="{FF2B5EF4-FFF2-40B4-BE49-F238E27FC236}">
-                <a16:creationId xmlns:a16="http://schemas.microsoft.com/office/drawing/2014/main" id="{00ABB6BD-737D-40A7-A9AF-7C82D81D4EB5}"/>
+                <a16:creationId xmlns:a16="http://schemas.microsoft.com/office/drawing/2014/main" id="{9A74F923-0830-492D-8CFB-E00B65C2B701}"/>
               </a:ext>
             </a:extLst>
           </p:cNvPr>
@@ -12902,7 +12919,7 @@
     </p:spTree>
     <p:extLst>
       <p:ext uri="{BB962C8B-B14F-4D97-AF65-F5344CB8AC3E}">
-        <p14:creationId xmlns:p14="http://schemas.microsoft.com/office/powerpoint/2010/main" val="1120077723"/>
+        <p14:creationId xmlns:p14="http://schemas.microsoft.com/office/powerpoint/2010/main" val="2134143814"/>
       </p:ext>
     </p:extLst>
   </p:cSld>
@@ -12934,6 +12951,121 @@
           <p:cNvPr id="2" name="Titre 1">
             <a:extLst>
               <a:ext uri="{FF2B5EF4-FFF2-40B4-BE49-F238E27FC236}">
+                <a16:creationId xmlns:a16="http://schemas.microsoft.com/office/drawing/2014/main" id="{8FF24F8E-356C-4CC3-BC1E-183A9E686F01}"/>
+              </a:ext>
+            </a:extLst>
+          </p:cNvPr>
+          <p:cNvSpPr>
+            <a:spLocks noGrp="1"/>
+          </p:cNvSpPr>
+          <p:nvPr>
+            <p:ph type="title"/>
+          </p:nvPr>
+        </p:nvSpPr>
+        <p:spPr/>
+        <p:txBody>
+          <a:bodyPr/>
+          <a:lstStyle/>
+          <a:p>
+            <a:r>
+              <a:rPr lang="fr-BE" dirty="0"/>
+              <a:t>Exercice 6</a:t>
+            </a:r>
+          </a:p>
+        </p:txBody>
+      </p:sp>
+      <p:sp>
+        <p:nvSpPr>
+          <p:cNvPr id="3" name="Espace réservé du contenu 2">
+            <a:extLst>
+              <a:ext uri="{FF2B5EF4-FFF2-40B4-BE49-F238E27FC236}">
+                <a16:creationId xmlns:a16="http://schemas.microsoft.com/office/drawing/2014/main" id="{9EBC696B-CBBE-40F0-942D-93CF2E900B7C}"/>
+              </a:ext>
+            </a:extLst>
+          </p:cNvPr>
+          <p:cNvSpPr>
+            <a:spLocks noGrp="1"/>
+          </p:cNvSpPr>
+          <p:nvPr>
+            <p:ph idx="1"/>
+          </p:nvPr>
+        </p:nvSpPr>
+        <p:spPr/>
+        <p:txBody>
+          <a:bodyPr/>
+          <a:lstStyle/>
+          <a:p>
+            <a:r>
+              <a:rPr lang="fr-BE" dirty="0"/>
+              <a:t>Envoyer une information vers un serveur</a:t>
+            </a:r>
+          </a:p>
+        </p:txBody>
+      </p:sp>
+      <p:sp>
+        <p:nvSpPr>
+          <p:cNvPr id="5" name="Espace réservé du numéro de diapositive 4">
+            <a:extLst>
+              <a:ext uri="{FF2B5EF4-FFF2-40B4-BE49-F238E27FC236}">
+                <a16:creationId xmlns:a16="http://schemas.microsoft.com/office/drawing/2014/main" id="{00ABB6BD-737D-40A7-A9AF-7C82D81D4EB5}"/>
+              </a:ext>
+            </a:extLst>
+          </p:cNvPr>
+          <p:cNvSpPr>
+            <a:spLocks noGrp="1"/>
+          </p:cNvSpPr>
+          <p:nvPr>
+            <p:ph type="sldNum" sz="quarter" idx="12"/>
+          </p:nvPr>
+        </p:nvSpPr>
+        <p:spPr/>
+        <p:txBody>
+          <a:bodyPr/>
+          <a:lstStyle/>
+          <a:p>
+            <a:fld id="{7D3627B9-1F90-4568-B521-4CB3E5CC102E}" type="slidenum">
+              <a:rPr lang="fr-BE" smtClean="0"/>
+              <a:t>27</a:t>
+            </a:fld>
+            <a:endParaRPr lang="fr-BE"/>
+          </a:p>
+        </p:txBody>
+      </p:sp>
+    </p:spTree>
+    <p:extLst>
+      <p:ext uri="{BB962C8B-B14F-4D97-AF65-F5344CB8AC3E}">
+        <p14:creationId xmlns:p14="http://schemas.microsoft.com/office/powerpoint/2010/main" val="1120077723"/>
+      </p:ext>
+    </p:extLst>
+  </p:cSld>
+  <p:clrMapOvr>
+    <a:masterClrMapping/>
+  </p:clrMapOvr>
+</p:sld>
+</file>
+
+<file path=ppt/slides/slide28.xml><?xml version="1.0" encoding="utf-8"?>
+<p:sld xmlns:a="http://schemas.openxmlformats.org/drawingml/2006/main" xmlns:r="http://schemas.openxmlformats.org/officeDocument/2006/relationships" xmlns:p="http://schemas.openxmlformats.org/presentationml/2006/main">
+  <p:cSld>
+    <p:spTree>
+      <p:nvGrpSpPr>
+        <p:cNvPr id="1" name=""/>
+        <p:cNvGrpSpPr/>
+        <p:nvPr/>
+      </p:nvGrpSpPr>
+      <p:grpSpPr>
+        <a:xfrm>
+          <a:off x="0" y="0"/>
+          <a:ext cx="0" cy="0"/>
+          <a:chOff x="0" y="0"/>
+          <a:chExt cx="0" cy="0"/>
+        </a:xfrm>
+      </p:grpSpPr>
+      <p:sp>
+        <p:nvSpPr>
+          <p:cNvPr id="2" name="Titre 1">
+            <a:extLst>
+              <a:ext uri="{FF2B5EF4-FFF2-40B4-BE49-F238E27FC236}">
                 <a16:creationId xmlns:a16="http://schemas.microsoft.com/office/drawing/2014/main" id="{D718C334-CD41-4112-92DE-B952B89E10D6}"/>
               </a:ext>
             </a:extLst>
@@ -13014,7 +13146,7 @@
           <a:p>
             <a:fld id="{7D3627B9-1F90-4568-B521-4CB3E5CC102E}" type="slidenum">
               <a:rPr lang="fr-BE" smtClean="0"/>
-              <a:t>27</a:t>
+              <a:t>28</a:t>
             </a:fld>
             <a:endParaRPr lang="fr-BE"/>
           </a:p>
@@ -13033,7 +13165,7 @@
 </p:sld>
 </file>
 
-<file path=ppt/slides/slide28.xml><?xml version="1.0" encoding="utf-8"?>
+<file path=ppt/slides/slide29.xml><?xml version="1.0" encoding="utf-8"?>
 <p:sld xmlns:a="http://schemas.openxmlformats.org/drawingml/2006/main" xmlns:r="http://schemas.openxmlformats.org/officeDocument/2006/relationships" xmlns:p="http://schemas.openxmlformats.org/presentationml/2006/main">
   <p:cSld>
     <p:bg>
@@ -13562,7 +13694,7 @@
           <a:p>
             <a:fld id="{7D3627B9-1F90-4568-B521-4CB3E5CC102E}" type="slidenum">
               <a:rPr lang="fr-BE" smtClean="0"/>
-              <a:t>28</a:t>
+              <a:t>29</a:t>
             </a:fld>
             <a:endParaRPr lang="fr-BE"/>
           </a:p>
@@ -13572,328 +13704,6 @@
     <p:extLst>
       <p:ext uri="{BB962C8B-B14F-4D97-AF65-F5344CB8AC3E}">
         <p14:creationId xmlns:p14="http://schemas.microsoft.com/office/powerpoint/2010/main" val="1339261554"/>
-      </p:ext>
-    </p:extLst>
-  </p:cSld>
-  <p:clrMapOvr>
-    <a:masterClrMapping/>
-  </p:clrMapOvr>
-</p:sld>
-</file>
-
-<file path=ppt/slides/slide29.xml><?xml version="1.0" encoding="utf-8"?>
-<p:sld xmlns:a="http://schemas.openxmlformats.org/drawingml/2006/main" xmlns:r="http://schemas.openxmlformats.org/officeDocument/2006/relationships" xmlns:p="http://schemas.openxmlformats.org/presentationml/2006/main">
-  <p:cSld>
-    <p:bg>
-      <p:bgPr>
-        <a:solidFill>
-          <a:schemeClr val="bg1"/>
-        </a:solidFill>
-        <a:effectLst/>
-      </p:bgPr>
-    </p:bg>
-    <p:spTree>
-      <p:nvGrpSpPr>
-        <p:cNvPr id="1" name=""/>
-        <p:cNvGrpSpPr/>
-        <p:nvPr/>
-      </p:nvGrpSpPr>
-      <p:grpSpPr>
-        <a:xfrm>
-          <a:off x="0" y="0"/>
-          <a:ext cx="0" cy="0"/>
-          <a:chOff x="0" y="0"/>
-          <a:chExt cx="0" cy="0"/>
-        </a:xfrm>
-      </p:grpSpPr>
-      <p:sp>
-        <p:nvSpPr>
-          <p:cNvPr id="12" name="Rectangle 11">
-            <a:extLst>
-              <a:ext uri="{FF2B5EF4-FFF2-40B4-BE49-F238E27FC236}">
-                <a16:creationId xmlns:a16="http://schemas.microsoft.com/office/drawing/2014/main" id="{86197D16-FE75-4A0E-A0C9-28C0F04A43DF}"/>
-              </a:ext>
-              <a:ext uri="{C183D7F6-B498-43B3-948B-1728B52AA6E4}">
-                <adec:decorative xmlns:adec="http://schemas.microsoft.com/office/drawing/2017/decorative" val="1"/>
-              </a:ext>
-            </a:extLst>
-          </p:cNvPr>
-          <p:cNvSpPr>
-            <a:spLocks noGrp="1" noRot="1" noChangeAspect="1" noMove="1" noResize="1" noEditPoints="1" noAdjustHandles="1" noChangeArrowheads="1" noChangeShapeType="1" noTextEdit="1"/>
-          </p:cNvSpPr>
-          <p:nvPr>
-            <p:extLst>
-              <p:ext uri="{386F3935-93C4-4BCD-93E2-E3B085C9AB24}">
-                <p16:designElem xmlns:p16="http://schemas.microsoft.com/office/powerpoint/2015/main" val="1"/>
-              </p:ext>
-            </p:extLst>
-          </p:nvPr>
-        </p:nvSpPr>
-        <p:spPr>
-          <a:xfrm>
-            <a:off x="0" y="0"/>
-            <a:ext cx="12192000" cy="5570220"/>
-          </a:xfrm>
-          <a:prstGeom prst="rect">
-            <a:avLst/>
-          </a:prstGeom>
-          <a:gradFill>
-            <a:gsLst>
-              <a:gs pos="0">
-                <a:schemeClr val="accent1">
-                  <a:lumMod val="90000"/>
-                </a:schemeClr>
-              </a:gs>
-              <a:gs pos="25000">
-                <a:schemeClr val="accent1">
-                  <a:lumMod val="90000"/>
-                </a:schemeClr>
-              </a:gs>
-              <a:gs pos="94000">
-                <a:schemeClr val="bg2">
-                  <a:lumMod val="25000"/>
-                </a:schemeClr>
-              </a:gs>
-              <a:gs pos="100000">
-                <a:schemeClr val="bg2">
-                  <a:lumMod val="25000"/>
-                </a:schemeClr>
-              </a:gs>
-            </a:gsLst>
-            <a:lin ang="4200000" scaled="0"/>
-          </a:gradFill>
-          <a:ln>
-            <a:noFill/>
-          </a:ln>
-        </p:spPr>
-        <p:style>
-          <a:lnRef idx="2">
-            <a:schemeClr val="accent1">
-              <a:shade val="50000"/>
-            </a:schemeClr>
-          </a:lnRef>
-          <a:fillRef idx="1">
-            <a:schemeClr val="accent1"/>
-          </a:fillRef>
-          <a:effectRef idx="0">
-            <a:schemeClr val="accent1"/>
-          </a:effectRef>
-          <a:fontRef idx="minor">
-            <a:schemeClr val="lt1"/>
-          </a:fontRef>
-        </p:style>
-        <p:txBody>
-          <a:bodyPr rtlCol="0" anchor="ctr"/>
-          <a:lstStyle/>
-          <a:p>
-            <a:pPr algn="ctr"/>
-            <a:endParaRPr lang="en-US"/>
-          </a:p>
-        </p:txBody>
-      </p:sp>
-      <p:pic>
-        <p:nvPicPr>
-          <p:cNvPr id="14" name="Picture 13">
-            <a:extLst>
-              <a:ext uri="{FF2B5EF4-FFF2-40B4-BE49-F238E27FC236}">
-                <a16:creationId xmlns:a16="http://schemas.microsoft.com/office/drawing/2014/main" id="{FA8FCEC6-4B30-4FF2-8B32-504BEAEA3A16}"/>
-              </a:ext>
-              <a:ext uri="{C183D7F6-B498-43B3-948B-1728B52AA6E4}">
-                <adec:decorative xmlns:adec="http://schemas.microsoft.com/office/drawing/2017/decorative" val="1"/>
-              </a:ext>
-            </a:extLst>
-          </p:cNvPr>
-          <p:cNvPicPr>
-            <a:picLocks noGrp="1" noRot="1" noChangeAspect="1" noMove="1" noResize="1" noEditPoints="1" noAdjustHandles="1" noChangeArrowheads="1" noChangeShapeType="1" noCrop="1"/>
-          </p:cNvPicPr>
-          <p:nvPr>
-            <p:extLst>
-              <p:ext uri="{386F3935-93C4-4BCD-93E2-E3B085C9AB24}">
-                <p16:designElem xmlns:p16="http://schemas.microsoft.com/office/powerpoint/2015/main" val="1"/>
-              </p:ext>
-            </p:extLst>
-          </p:nvPr>
-        </p:nvPicPr>
-        <p:blipFill>
-          <a:blip r:embed="rId3">
-            <a:extLst>
-              <a:ext uri="{28A0092B-C50C-407E-A947-70E740481C1C}">
-                <a14:useLocalDpi xmlns:a14="http://schemas.microsoft.com/office/drawing/2010/main" val="0"/>
-              </a:ext>
-            </a:extLst>
-          </a:blip>
-          <a:srcRect t="45716" b="9820"/>
-          <a:stretch>
-            <a:fillRect/>
-          </a:stretch>
-        </p:blipFill>
-        <p:spPr>
-          <a:xfrm>
-            <a:off x="0" y="3808676"/>
-            <a:ext cx="12192000" cy="3049325"/>
-          </a:xfrm>
-          <a:custGeom>
-            <a:avLst/>
-            <a:gdLst>
-              <a:gd name="connsiteX0" fmla="*/ 0 w 12192000"/>
-              <a:gd name="connsiteY0" fmla="*/ 0 h 3049325"/>
-              <a:gd name="connsiteX1" fmla="*/ 12192000 w 12192000"/>
-              <a:gd name="connsiteY1" fmla="*/ 0 h 3049325"/>
-              <a:gd name="connsiteX2" fmla="*/ 12192000 w 12192000"/>
-              <a:gd name="connsiteY2" fmla="*/ 3049325 h 3049325"/>
-              <a:gd name="connsiteX3" fmla="*/ 0 w 12192000"/>
-              <a:gd name="connsiteY3" fmla="*/ 3049325 h 3049325"/>
-            </a:gdLst>
-            <a:ahLst/>
-            <a:cxnLst>
-              <a:cxn ang="0">
-                <a:pos x="connsiteX0" y="connsiteY0"/>
-              </a:cxn>
-              <a:cxn ang="0">
-                <a:pos x="connsiteX1" y="connsiteY1"/>
-              </a:cxn>
-              <a:cxn ang="0">
-                <a:pos x="connsiteX2" y="connsiteY2"/>
-              </a:cxn>
-              <a:cxn ang="0">
-                <a:pos x="connsiteX3" y="connsiteY3"/>
-              </a:cxn>
-            </a:cxnLst>
-            <a:rect l="l" t="t" r="r" b="b"/>
-            <a:pathLst>
-              <a:path w="12192000" h="3049325">
-                <a:moveTo>
-                  <a:pt x="0" y="0"/>
-                </a:moveTo>
-                <a:lnTo>
-                  <a:pt x="12192000" y="0"/>
-                </a:lnTo>
-                <a:lnTo>
-                  <a:pt x="12192000" y="3049325"/>
-                </a:lnTo>
-                <a:lnTo>
-                  <a:pt x="0" y="3049325"/>
-                </a:lnTo>
-                <a:close/>
-              </a:path>
-            </a:pathLst>
-          </a:custGeom>
-        </p:spPr>
-      </p:pic>
-      <p:sp>
-        <p:nvSpPr>
-          <p:cNvPr id="2" name="Titre 1">
-            <a:extLst>
-              <a:ext uri="{FF2B5EF4-FFF2-40B4-BE49-F238E27FC236}">
-                <a16:creationId xmlns:a16="http://schemas.microsoft.com/office/drawing/2014/main" id="{BD96AA03-57BD-432D-88C4-5DA65781DE72}"/>
-              </a:ext>
-            </a:extLst>
-          </p:cNvPr>
-          <p:cNvSpPr>
-            <a:spLocks noGrp="1"/>
-          </p:cNvSpPr>
-          <p:nvPr>
-            <p:ph type="title"/>
-          </p:nvPr>
-        </p:nvSpPr>
-        <p:spPr>
-          <a:xfrm>
-            <a:off x="804484" y="1191796"/>
-            <a:ext cx="10021446" cy="2976344"/>
-          </a:xfrm>
-        </p:spPr>
-        <p:txBody>
-          <a:bodyPr vert="horz" lIns="91440" tIns="45720" rIns="91440" bIns="45720" rtlCol="0" anchor="ctr">
-            <a:normAutofit/>
-          </a:bodyPr>
-          <a:lstStyle/>
-          <a:p>
-            <a:r>
-              <a:rPr lang="en-US" sz="6600" kern="1200">
-                <a:solidFill>
-                  <a:srgbClr val="FFFFFF"/>
-                </a:solidFill>
-                <a:latin typeface="+mj-lt"/>
-                <a:ea typeface="+mj-ea"/>
-                <a:cs typeface="+mj-cs"/>
-              </a:rPr>
-              <a:t>Et maintenant ?</a:t>
-            </a:r>
-          </a:p>
-        </p:txBody>
-      </p:sp>
-      <p:sp>
-        <p:nvSpPr>
-          <p:cNvPr id="7" name="Espace réservé du texte 6">
-            <a:extLst>
-              <a:ext uri="{FF2B5EF4-FFF2-40B4-BE49-F238E27FC236}">
-                <a16:creationId xmlns:a16="http://schemas.microsoft.com/office/drawing/2014/main" id="{B1A25F50-4B88-4649-8689-76C23D11618D}"/>
-              </a:ext>
-            </a:extLst>
-          </p:cNvPr>
-          <p:cNvSpPr>
-            <a:spLocks noGrp="1"/>
-          </p:cNvSpPr>
-          <p:nvPr>
-            <p:ph type="body" idx="1"/>
-          </p:nvPr>
-        </p:nvSpPr>
-        <p:spPr>
-          <a:xfrm>
-            <a:off x="804788" y="5318990"/>
-            <a:ext cx="9416898" cy="723670"/>
-          </a:xfrm>
-        </p:spPr>
-        <p:txBody>
-          <a:bodyPr vert="horz" lIns="91440" tIns="45720" rIns="91440" bIns="45720" rtlCol="0" anchor="t">
-            <a:normAutofit/>
-          </a:bodyPr>
-          <a:lstStyle/>
-          <a:p>
-            <a:endParaRPr lang="en-US" sz="1800" kern="1200">
-              <a:solidFill>
-                <a:srgbClr val="000000"/>
-              </a:solidFill>
-              <a:latin typeface="+mn-lt"/>
-              <a:ea typeface="+mn-ea"/>
-              <a:cs typeface="+mn-cs"/>
-            </a:endParaRPr>
-          </a:p>
-        </p:txBody>
-      </p:sp>
-      <p:sp>
-        <p:nvSpPr>
-          <p:cNvPr id="4" name="Espace réservé du numéro de diapositive 3">
-            <a:extLst>
-              <a:ext uri="{FF2B5EF4-FFF2-40B4-BE49-F238E27FC236}">
-                <a16:creationId xmlns:a16="http://schemas.microsoft.com/office/drawing/2014/main" id="{2037B5A5-A1B9-4A40-8746-6B8CAF48326F}"/>
-              </a:ext>
-            </a:extLst>
-          </p:cNvPr>
-          <p:cNvSpPr>
-            <a:spLocks noGrp="1"/>
-          </p:cNvSpPr>
-          <p:nvPr>
-            <p:ph type="sldNum" sz="quarter" idx="12"/>
-          </p:nvPr>
-        </p:nvSpPr>
-        <p:spPr/>
-        <p:txBody>
-          <a:bodyPr/>
-          <a:lstStyle/>
-          <a:p>
-            <a:fld id="{7D3627B9-1F90-4568-B521-4CB3E5CC102E}" type="slidenum">
-              <a:rPr lang="fr-BE" smtClean="0"/>
-              <a:t>29</a:t>
-            </a:fld>
-            <a:endParaRPr lang="fr-BE"/>
-          </a:p>
-        </p:txBody>
-      </p:sp>
-    </p:spTree>
-    <p:extLst>
-      <p:ext uri="{BB962C8B-B14F-4D97-AF65-F5344CB8AC3E}">
-        <p14:creationId xmlns:p14="http://schemas.microsoft.com/office/powerpoint/2010/main" val="2429384979"/>
       </p:ext>
     </p:extLst>
   </p:cSld>
@@ -14128,7 +13938,7 @@
             </p:grpSpPr>
             <p:pic>
               <p:nvPicPr>
-                <p:cNvPr id="6" name="Image 6">
+                <p:cNvPr id="3" name="Image 3">
                   <a:hlinkClick r:id="rId7" action="ppaction://hlinksldjump"/>
                 </p:cNvPr>
                 <p:cNvPicPr>
@@ -14159,7 +13969,7 @@
             </p:pic>
             <p:pic>
               <p:nvPicPr>
-                <p:cNvPr id="7" name="Image 7">
+                <p:cNvPr id="4" name="Image 4">
                   <a:hlinkClick r:id="rId8" action="ppaction://hlinksldjump"/>
                 </p:cNvPr>
                 <p:cNvPicPr>
@@ -14190,7 +14000,7 @@
             </p:pic>
             <p:pic>
               <p:nvPicPr>
-                <p:cNvPr id="8" name="Image 8">
+                <p:cNvPr id="6" name="Image 6">
                   <a:hlinkClick r:id="rId9" action="ppaction://hlinksldjump"/>
                 </p:cNvPr>
                 <p:cNvPicPr>
@@ -14221,7 +14031,7 @@
             </p:pic>
             <p:pic>
               <p:nvPicPr>
-                <p:cNvPr id="9" name="Image 9">
+                <p:cNvPr id="7" name="Image 7">
                   <a:hlinkClick r:id="rId10" action="ppaction://hlinksldjump"/>
                 </p:cNvPr>
                 <p:cNvPicPr>
@@ -14252,7 +14062,7 @@
             </p:pic>
             <p:pic>
               <p:nvPicPr>
-                <p:cNvPr id="10" name="Image 10">
+                <p:cNvPr id="8" name="Image 8">
                   <a:hlinkClick r:id="rId11" action="ppaction://hlinksldjump"/>
                 </p:cNvPr>
                 <p:cNvPicPr>
@@ -14327,184 +14137,6 @@
 </file>
 
 <file path=ppt/slides/slide30.xml><?xml version="1.0" encoding="utf-8"?>
-<p:sld xmlns:a="http://schemas.openxmlformats.org/drawingml/2006/main" xmlns:r="http://schemas.openxmlformats.org/officeDocument/2006/relationships" xmlns:p="http://schemas.openxmlformats.org/presentationml/2006/main">
-  <p:cSld>
-    <p:spTree>
-      <p:nvGrpSpPr>
-        <p:cNvPr id="1" name=""/>
-        <p:cNvGrpSpPr/>
-        <p:nvPr/>
-      </p:nvGrpSpPr>
-      <p:grpSpPr>
-        <a:xfrm>
-          <a:off x="0" y="0"/>
-          <a:ext cx="0" cy="0"/>
-          <a:chOff x="0" y="0"/>
-          <a:chExt cx="0" cy="0"/>
-        </a:xfrm>
-      </p:grpSpPr>
-      <p:sp>
-        <p:nvSpPr>
-          <p:cNvPr id="2" name="Titre 1">
-            <a:extLst>
-              <a:ext uri="{FF2B5EF4-FFF2-40B4-BE49-F238E27FC236}">
-                <a16:creationId xmlns:a16="http://schemas.microsoft.com/office/drawing/2014/main" id="{BD96AA03-57BD-432D-88C4-5DA65781DE72}"/>
-              </a:ext>
-            </a:extLst>
-          </p:cNvPr>
-          <p:cNvSpPr>
-            <a:spLocks noGrp="1"/>
-          </p:cNvSpPr>
-          <p:nvPr>
-            <p:ph type="title"/>
-          </p:nvPr>
-        </p:nvSpPr>
-        <p:spPr/>
-        <p:txBody>
-          <a:bodyPr/>
-          <a:lstStyle/>
-          <a:p>
-            <a:endParaRPr lang="fr-BE" dirty="0"/>
-          </a:p>
-        </p:txBody>
-      </p:sp>
-      <p:sp>
-        <p:nvSpPr>
-          <p:cNvPr id="3" name="Espace réservé du contenu 2">
-            <a:extLst>
-              <a:ext uri="{FF2B5EF4-FFF2-40B4-BE49-F238E27FC236}">
-                <a16:creationId xmlns:a16="http://schemas.microsoft.com/office/drawing/2014/main" id="{7F4BB985-DE47-4CCB-982E-88D4FF516AF9}"/>
-              </a:ext>
-            </a:extLst>
-          </p:cNvPr>
-          <p:cNvSpPr>
-            <a:spLocks noGrp="1"/>
-          </p:cNvSpPr>
-          <p:nvPr>
-            <p:ph idx="1"/>
-          </p:nvPr>
-        </p:nvSpPr>
-        <p:spPr/>
-        <p:txBody>
-          <a:bodyPr/>
-          <a:lstStyle/>
-          <a:p>
-            <a:r>
-              <a:rPr lang="fr-BE" dirty="0"/>
-              <a:t>Apprenez-en plus sur l’IoT</a:t>
-            </a:r>
-          </a:p>
-          <a:p>
-            <a:pPr lvl="1"/>
-            <a:r>
-              <a:rPr lang="fr-BE" dirty="0"/>
-              <a:t>Ateliers </a:t>
-            </a:r>
-            <a:r>
-              <a:rPr lang="fr-BE" dirty="0" err="1"/>
-              <a:t>CRéACTIFS</a:t>
-            </a:r>
-            <a:r>
-              <a:rPr lang="fr-BE" dirty="0"/>
-              <a:t> par l’institut </a:t>
-            </a:r>
-            <a:r>
-              <a:rPr lang="fr-BE" dirty="0" err="1"/>
-              <a:t>Numédiart</a:t>
-            </a:r>
-            <a:endParaRPr lang="fr-BE" dirty="0"/>
-          </a:p>
-          <a:p>
-            <a:pPr lvl="1"/>
-            <a:r>
-              <a:rPr lang="fr-BE" dirty="0"/>
-              <a:t>Formations </a:t>
-            </a:r>
-            <a:r>
-              <a:rPr lang="fr-BE" dirty="0" err="1"/>
-              <a:t>Technocité</a:t>
-            </a:r>
-            <a:endParaRPr lang="fr-BE" dirty="0"/>
-          </a:p>
-          <a:p>
-            <a:r>
-              <a:rPr lang="fr-BE" dirty="0"/>
-              <a:t>Développez votre prototype avec </a:t>
-            </a:r>
-            <a:r>
-              <a:rPr lang="fr-BE" dirty="0" err="1"/>
-              <a:t>Fab</a:t>
-            </a:r>
-            <a:r>
-              <a:rPr lang="fr-BE" dirty="0"/>
-              <a:t>-IoT-</a:t>
-            </a:r>
-            <a:r>
-              <a:rPr lang="fr-BE" dirty="0" err="1"/>
-              <a:t>Lab</a:t>
-            </a:r>
-            <a:endParaRPr lang="fr-BE" dirty="0"/>
-          </a:p>
-          <a:p>
-            <a:endParaRPr lang="fr-BE" dirty="0"/>
-          </a:p>
-          <a:p>
-            <a:pPr marL="0" indent="0" algn="ctr">
-              <a:buNone/>
-            </a:pPr>
-            <a:r>
-              <a:rPr lang="fr-BE" dirty="0">
-                <a:hlinkClick r:id="rId3"/>
-              </a:rPr>
-              <a:t>fabiotlab@fablabmons.be</a:t>
-            </a:r>
-            <a:endParaRPr lang="fr-BE" dirty="0"/>
-          </a:p>
-        </p:txBody>
-      </p:sp>
-      <p:sp>
-        <p:nvSpPr>
-          <p:cNvPr id="6" name="Espace réservé du numéro de diapositive 5">
-            <a:extLst>
-              <a:ext uri="{FF2B5EF4-FFF2-40B4-BE49-F238E27FC236}">
-                <a16:creationId xmlns:a16="http://schemas.microsoft.com/office/drawing/2014/main" id="{A32E2021-9613-4390-976A-439897B08FB1}"/>
-              </a:ext>
-            </a:extLst>
-          </p:cNvPr>
-          <p:cNvSpPr>
-            <a:spLocks noGrp="1"/>
-          </p:cNvSpPr>
-          <p:nvPr>
-            <p:ph type="sldNum" sz="quarter" idx="12"/>
-          </p:nvPr>
-        </p:nvSpPr>
-        <p:spPr/>
-        <p:txBody>
-          <a:bodyPr/>
-          <a:lstStyle/>
-          <a:p>
-            <a:fld id="{7D3627B9-1F90-4568-B521-4CB3E5CC102E}" type="slidenum">
-              <a:rPr lang="fr-BE" smtClean="0"/>
-              <a:t>30</a:t>
-            </a:fld>
-            <a:endParaRPr lang="fr-BE"/>
-          </a:p>
-        </p:txBody>
-      </p:sp>
-    </p:spTree>
-    <p:extLst>
-      <p:ext uri="{BB962C8B-B14F-4D97-AF65-F5344CB8AC3E}">
-        <p14:creationId xmlns:p14="http://schemas.microsoft.com/office/powerpoint/2010/main" val="1910355657"/>
-      </p:ext>
-    </p:extLst>
-  </p:cSld>
-  <p:clrMapOvr>
-    <a:masterClrMapping/>
-  </p:clrMapOvr>
-</p:sld>
-</file>
-
-<file path=ppt/slides/slide4.xml><?xml version="1.0" encoding="utf-8"?>
 <p:sld xmlns:a="http://schemas.openxmlformats.org/drawingml/2006/main" xmlns:r="http://schemas.openxmlformats.org/officeDocument/2006/relationships" xmlns:p="http://schemas.openxmlformats.org/presentationml/2006/main">
   <p:cSld>
     <p:bg>
@@ -14708,7 +14340,7 @@
           <p:cNvPr id="2" name="Titre 1">
             <a:extLst>
               <a:ext uri="{FF2B5EF4-FFF2-40B4-BE49-F238E27FC236}">
-                <a16:creationId xmlns:a16="http://schemas.microsoft.com/office/drawing/2014/main" id="{039C04F1-C087-4722-9AAF-758A18B1D1E3}"/>
+                <a16:creationId xmlns:a16="http://schemas.microsoft.com/office/drawing/2014/main" id="{BD96AA03-57BD-432D-88C4-5DA65781DE72}"/>
               </a:ext>
             </a:extLst>
           </p:cNvPr>
@@ -14740,7 +14372,7 @@
                 <a:ea typeface="+mj-ea"/>
                 <a:cs typeface="+mj-cs"/>
               </a:rPr>
-              <a:t>Qu’est-ce que Fab-IoT-Lab ?</a:t>
+              <a:t>Et maintenant ?</a:t>
             </a:r>
           </a:p>
         </p:txBody>
@@ -14750,7 +14382,7 @@
           <p:cNvPr id="7" name="Espace réservé du texte 6">
             <a:extLst>
               <a:ext uri="{FF2B5EF4-FFF2-40B4-BE49-F238E27FC236}">
-                <a16:creationId xmlns:a16="http://schemas.microsoft.com/office/drawing/2014/main" id="{481CD277-E25B-4923-A709-7B77720D310D}"/>
+                <a16:creationId xmlns:a16="http://schemas.microsoft.com/office/drawing/2014/main" id="{B1A25F50-4B88-4649-8689-76C23D11618D}"/>
               </a:ext>
             </a:extLst>
           </p:cNvPr>
@@ -14786,10 +14418,10 @@
       </p:sp>
       <p:sp>
         <p:nvSpPr>
-          <p:cNvPr id="5" name="Espace réservé du numéro de diapositive 4">
+          <p:cNvPr id="4" name="Espace réservé du numéro de diapositive 3">
             <a:extLst>
               <a:ext uri="{FF2B5EF4-FFF2-40B4-BE49-F238E27FC236}">
-                <a16:creationId xmlns:a16="http://schemas.microsoft.com/office/drawing/2014/main" id="{283A00C4-72B8-41F4-9640-A3A4CD94A1E5}"/>
+                <a16:creationId xmlns:a16="http://schemas.microsoft.com/office/drawing/2014/main" id="{2037B5A5-A1B9-4A40-8746-6B8CAF48326F}"/>
               </a:ext>
             </a:extLst>
           </p:cNvPr>
@@ -14807,7 +14439,7 @@
           <a:p>
             <a:fld id="{7D3627B9-1F90-4568-B521-4CB3E5CC102E}" type="slidenum">
               <a:rPr lang="fr-BE" smtClean="0"/>
-              <a:t>4</a:t>
+              <a:t>30</a:t>
             </a:fld>
             <a:endParaRPr lang="fr-BE"/>
           </a:p>
@@ -14816,7 +14448,7 @@
     </p:spTree>
     <p:extLst>
       <p:ext uri="{BB962C8B-B14F-4D97-AF65-F5344CB8AC3E}">
-        <p14:creationId xmlns:p14="http://schemas.microsoft.com/office/powerpoint/2010/main" val="2415528101"/>
+        <p14:creationId xmlns:p14="http://schemas.microsoft.com/office/powerpoint/2010/main" val="2429384979"/>
       </p:ext>
     </p:extLst>
   </p:cSld>
@@ -14826,7 +14458,7 @@
 </p:sld>
 </file>
 
-<file path=ppt/slides/slide5.xml><?xml version="1.0" encoding="utf-8"?>
+<file path=ppt/slides/slide31.xml><?xml version="1.0" encoding="utf-8"?>
 <p:sld xmlns:a="http://schemas.openxmlformats.org/drawingml/2006/main" xmlns:r="http://schemas.openxmlformats.org/officeDocument/2006/relationships" xmlns:p="http://schemas.openxmlformats.org/presentationml/2006/main">
   <p:cSld>
     <p:spTree>
@@ -14848,7 +14480,7 @@
           <p:cNvPr id="2" name="Titre 1">
             <a:extLst>
               <a:ext uri="{FF2B5EF4-FFF2-40B4-BE49-F238E27FC236}">
-                <a16:creationId xmlns:a16="http://schemas.microsoft.com/office/drawing/2014/main" id="{21729781-F766-44B3-9C6C-44939FE4CA80}"/>
+                <a16:creationId xmlns:a16="http://schemas.microsoft.com/office/drawing/2014/main" id="{BD96AA03-57BD-432D-88C4-5DA65781DE72}"/>
               </a:ext>
             </a:extLst>
           </p:cNvPr>
@@ -14868,96 +14500,109 @@
           </a:p>
         </p:txBody>
       </p:sp>
-      <p:pic>
-        <p:nvPicPr>
-          <p:cNvPr id="7" name="Espace réservé du contenu 6">
+      <p:sp>
+        <p:nvSpPr>
+          <p:cNvPr id="3" name="Espace réservé du contenu 2">
             <a:extLst>
               <a:ext uri="{FF2B5EF4-FFF2-40B4-BE49-F238E27FC236}">
-                <a16:creationId xmlns:a16="http://schemas.microsoft.com/office/drawing/2014/main" id="{C9A3869D-FA32-4C42-974C-910FEAD4849A}"/>
+                <a16:creationId xmlns:a16="http://schemas.microsoft.com/office/drawing/2014/main" id="{7F4BB985-DE47-4CCB-982E-88D4FF516AF9}"/>
               </a:ext>
             </a:extLst>
           </p:cNvPr>
-          <p:cNvPicPr>
-            <a:picLocks noGrp="1" noChangeAspect="1"/>
-          </p:cNvPicPr>
-          <p:nvPr>
-            <p:ph sz="half" idx="1"/>
-          </p:nvPr>
-        </p:nvPicPr>
-        <p:blipFill rotWithShape="1">
-          <a:blip r:embed="rId3">
-            <a:extLst>
-              <a:ext uri="{28A0092B-C50C-407E-A947-70E740481C1C}">
-                <a14:useLocalDpi xmlns:a14="http://schemas.microsoft.com/office/drawing/2010/main" val="0"/>
-              </a:ext>
-            </a:extLst>
-          </a:blip>
-          <a:stretch/>
-        </p:blipFill>
-        <p:spPr>
-          <a:xfrm>
-            <a:off x="838200" y="2167426"/>
-            <a:ext cx="5181600" cy="3667735"/>
-          </a:xfrm>
-        </p:spPr>
-      </p:pic>
-      <p:pic>
-        <p:nvPicPr>
-          <p:cNvPr id="6146" name="Picture 2" descr="RÃ©sultat de recherche d'images pour &quot;umons&quot;">
+          <p:cNvSpPr>
+            <a:spLocks noGrp="1"/>
+          </p:cNvSpPr>
+          <p:nvPr>
+            <p:ph idx="1"/>
+          </p:nvPr>
+        </p:nvSpPr>
+        <p:spPr/>
+        <p:txBody>
+          <a:bodyPr/>
+          <a:lstStyle/>
+          <a:p>
+            <a:r>
+              <a:rPr lang="fr-BE" dirty="0"/>
+              <a:t>Apprenez-en plus sur l’IoT</a:t>
+            </a:r>
+          </a:p>
+          <a:p>
+            <a:pPr lvl="1"/>
+            <a:r>
+              <a:rPr lang="fr-BE" dirty="0"/>
+              <a:t>Ateliers </a:t>
+            </a:r>
+            <a:r>
+              <a:rPr lang="fr-BE" dirty="0" err="1"/>
+              <a:t>CRéACTIFS</a:t>
+            </a:r>
+            <a:r>
+              <a:rPr lang="fr-BE" dirty="0"/>
+              <a:t> par l’institut </a:t>
+            </a:r>
+            <a:r>
+              <a:rPr lang="fr-BE" dirty="0" err="1"/>
+              <a:t>Numédiart</a:t>
+            </a:r>
+            <a:endParaRPr lang="fr-BE" dirty="0"/>
+          </a:p>
+          <a:p>
+            <a:pPr lvl="1"/>
+            <a:r>
+              <a:rPr lang="fr-BE" dirty="0"/>
+              <a:t>Formations </a:t>
+            </a:r>
+            <a:r>
+              <a:rPr lang="fr-BE" dirty="0" err="1"/>
+              <a:t>Technocité</a:t>
+            </a:r>
+            <a:endParaRPr lang="fr-BE" dirty="0"/>
+          </a:p>
+          <a:p>
+            <a:r>
+              <a:rPr lang="fr-BE" dirty="0"/>
+              <a:t>Développez votre prototype avec </a:t>
+            </a:r>
+            <a:r>
+              <a:rPr lang="fr-BE" dirty="0" err="1"/>
+              <a:t>Fab</a:t>
+            </a:r>
+            <a:r>
+              <a:rPr lang="fr-BE" dirty="0"/>
+              <a:t>-IoT-</a:t>
+            </a:r>
+            <a:r>
+              <a:rPr lang="fr-BE" dirty="0" err="1"/>
+              <a:t>Lab</a:t>
+            </a:r>
+            <a:endParaRPr lang="fr-BE" dirty="0"/>
+          </a:p>
+          <a:p>
+            <a:endParaRPr lang="fr-BE" dirty="0"/>
+          </a:p>
+          <a:p>
+            <a:pPr marL="0" indent="0" algn="ctr">
+              <a:buNone/>
+            </a:pPr>
+            <a:r>
+              <a:rPr lang="fr-BE" dirty="0">
+                <a:hlinkClick r:id="rId3"/>
+              </a:rPr>
+              <a:t>fabiotlab@fablabmons.be</a:t>
+            </a:r>
+            <a:endParaRPr lang="fr-BE" dirty="0"/>
+          </a:p>
+        </p:txBody>
+      </p:sp>
+      <p:sp>
+        <p:nvSpPr>
+          <p:cNvPr id="6" name="Espace réservé du numéro de diapositive 5">
             <a:extLst>
               <a:ext uri="{FF2B5EF4-FFF2-40B4-BE49-F238E27FC236}">
-                <a16:creationId xmlns:a16="http://schemas.microsoft.com/office/drawing/2014/main" id="{79C583BB-B5E5-4044-84A3-DD00A2E4AB11}"/>
+                <a16:creationId xmlns:a16="http://schemas.microsoft.com/office/drawing/2014/main" id="{A32E2021-9613-4390-976A-439897B08FB1}"/>
               </a:ext>
             </a:extLst>
           </p:cNvPr>
-          <p:cNvPicPr>
-            <a:picLocks noGrp="1" noChangeAspect="1" noChangeArrowheads="1"/>
-          </p:cNvPicPr>
-          <p:nvPr>
-            <p:ph sz="half" idx="2"/>
-          </p:nvPr>
-        </p:nvPicPr>
-        <p:blipFill>
-          <a:blip r:embed="rId4">
-            <a:extLst>
-              <a:ext uri="{28A0092B-C50C-407E-A947-70E740481C1C}">
-                <a14:useLocalDpi xmlns:a14="http://schemas.microsoft.com/office/drawing/2010/main" val="0"/>
-              </a:ext>
-            </a:extLst>
-          </a:blip>
-          <a:stretch>
-            <a:fillRect/>
-          </a:stretch>
-        </p:blipFill>
-        <p:spPr bwMode="auto">
-          <a:xfrm>
-            <a:off x="6573012" y="3214910"/>
-            <a:ext cx="4379976" cy="1572768"/>
-          </a:xfrm>
-          <a:prstGeom prst="rect">
-            <a:avLst/>
-          </a:prstGeom>
-          <a:noFill/>
-          <a:extLst>
-            <a:ext uri="{909E8E84-426E-40DD-AFC4-6F175D3DCCD1}">
-              <a14:hiddenFill xmlns:a14="http://schemas.microsoft.com/office/drawing/2010/main">
-                <a:solidFill>
-                  <a:srgbClr val="FFFFFF"/>
-                </a:solidFill>
-              </a14:hiddenFill>
-            </a:ext>
-          </a:extLst>
-        </p:spPr>
-      </p:pic>
-      <p:sp>
-        <p:nvSpPr>
-          <p:cNvPr id="5" name="Espace réservé du numéro de diapositive 4">
-            <a:extLst>
-              <a:ext uri="{FF2B5EF4-FFF2-40B4-BE49-F238E27FC236}">
-                <a16:creationId xmlns:a16="http://schemas.microsoft.com/office/drawing/2014/main" id="{9A43EBC4-261A-4A9D-A733-F5D8FF996C77}"/>
-              </a:ext>
-            </a:extLst>
-          </p:cNvPr>
           <p:cNvSpPr>
             <a:spLocks noGrp="1"/>
           </p:cNvSpPr>
@@ -14972,7 +14617,7 @@
           <a:p>
             <a:fld id="{7D3627B9-1F90-4568-B521-4CB3E5CC102E}" type="slidenum">
               <a:rPr lang="fr-BE" smtClean="0"/>
-              <a:t>5</a:t>
+              <a:t>31</a:t>
             </a:fld>
             <a:endParaRPr lang="fr-BE"/>
           </a:p>
@@ -14981,7 +14626,7 @@
     </p:spTree>
     <p:extLst>
       <p:ext uri="{BB962C8B-B14F-4D97-AF65-F5344CB8AC3E}">
-        <p14:creationId xmlns:p14="http://schemas.microsoft.com/office/powerpoint/2010/main" val="953089894"/>
+        <p14:creationId xmlns:p14="http://schemas.microsoft.com/office/powerpoint/2010/main" val="1910355657"/>
       </p:ext>
     </p:extLst>
   </p:cSld>
@@ -14991,104 +14636,7 @@
 </p:sld>
 </file>
 
-<file path=ppt/slides/slide6.xml><?xml version="1.0" encoding="utf-8"?>
-<p:sld xmlns:a="http://schemas.openxmlformats.org/drawingml/2006/main" xmlns:r="http://schemas.openxmlformats.org/officeDocument/2006/relationships" xmlns:p="http://schemas.openxmlformats.org/presentationml/2006/main">
-  <p:cSld>
-    <p:spTree>
-      <p:nvGrpSpPr>
-        <p:cNvPr id="1" name=""/>
-        <p:cNvGrpSpPr/>
-        <p:nvPr/>
-      </p:nvGrpSpPr>
-      <p:grpSpPr>
-        <a:xfrm>
-          <a:off x="0" y="0"/>
-          <a:ext cx="0" cy="0"/>
-          <a:chOff x="0" y="0"/>
-          <a:chExt cx="0" cy="0"/>
-        </a:xfrm>
-      </p:grpSpPr>
-      <p:pic>
-        <p:nvPicPr>
-          <p:cNvPr id="5" name="Espace réservé du contenu 4">
-            <a:extLst>
-              <a:ext uri="{FF2B5EF4-FFF2-40B4-BE49-F238E27FC236}">
-                <a16:creationId xmlns:a16="http://schemas.microsoft.com/office/drawing/2014/main" id="{B6BEDA4F-2E95-491B-8C08-B9B380E2F29F}"/>
-              </a:ext>
-            </a:extLst>
-          </p:cNvPr>
-          <p:cNvPicPr>
-            <a:picLocks noGrp="1" noChangeAspect="1"/>
-          </p:cNvPicPr>
-          <p:nvPr>
-            <p:ph idx="1"/>
-          </p:nvPr>
-        </p:nvPicPr>
-        <p:blipFill>
-          <a:blip r:embed="rId3">
-            <a:extLst>
-              <a:ext uri="{28A0092B-C50C-407E-A947-70E740481C1C}">
-                <a14:useLocalDpi xmlns:a14="http://schemas.microsoft.com/office/drawing/2010/main" val="0"/>
-              </a:ext>
-            </a:extLst>
-          </a:blip>
-          <a:stretch>
-            <a:fillRect/>
-          </a:stretch>
-        </p:blipFill>
-        <p:spPr>
-          <a:xfrm>
-            <a:off x="643467" y="2052235"/>
-            <a:ext cx="10905066" cy="2753529"/>
-          </a:xfrm>
-          <a:prstGeom prst="rect">
-            <a:avLst/>
-          </a:prstGeom>
-        </p:spPr>
-      </p:pic>
-      <p:sp>
-        <p:nvSpPr>
-          <p:cNvPr id="4" name="Espace réservé du numéro de diapositive 3">
-            <a:extLst>
-              <a:ext uri="{FF2B5EF4-FFF2-40B4-BE49-F238E27FC236}">
-                <a16:creationId xmlns:a16="http://schemas.microsoft.com/office/drawing/2014/main" id="{1FB0FEB1-1455-411C-BE19-4594C1F5C317}"/>
-              </a:ext>
-            </a:extLst>
-          </p:cNvPr>
-          <p:cNvSpPr>
-            <a:spLocks noGrp="1"/>
-          </p:cNvSpPr>
-          <p:nvPr>
-            <p:ph type="sldNum" sz="quarter" idx="12"/>
-          </p:nvPr>
-        </p:nvSpPr>
-        <p:spPr/>
-        <p:txBody>
-          <a:bodyPr/>
-          <a:lstStyle/>
-          <a:p>
-            <a:fld id="{7D3627B9-1F90-4568-B521-4CB3E5CC102E}" type="slidenum">
-              <a:rPr lang="fr-BE" smtClean="0"/>
-              <a:t>6</a:t>
-            </a:fld>
-            <a:endParaRPr lang="fr-BE"/>
-          </a:p>
-        </p:txBody>
-      </p:sp>
-    </p:spTree>
-    <p:extLst>
-      <p:ext uri="{BB962C8B-B14F-4D97-AF65-F5344CB8AC3E}">
-        <p14:creationId xmlns:p14="http://schemas.microsoft.com/office/powerpoint/2010/main" val="2676247997"/>
-      </p:ext>
-    </p:extLst>
-  </p:cSld>
-  <p:clrMapOvr>
-    <a:masterClrMapping/>
-  </p:clrMapOvr>
-</p:sld>
-</file>
-
-<file path=ppt/slides/slide7.xml><?xml version="1.0" encoding="utf-8"?>
+<file path=ppt/slides/slide4.xml><?xml version="1.0" encoding="utf-8"?>
 <p:sld xmlns:a="http://schemas.openxmlformats.org/drawingml/2006/main" xmlns:r="http://schemas.openxmlformats.org/officeDocument/2006/relationships" xmlns:p="http://schemas.openxmlformats.org/presentationml/2006/main">
   <p:cSld>
     <p:bg>
@@ -15292,7 +14840,7 @@
           <p:cNvPr id="2" name="Titre 1">
             <a:extLst>
               <a:ext uri="{FF2B5EF4-FFF2-40B4-BE49-F238E27FC236}">
-                <a16:creationId xmlns:a16="http://schemas.microsoft.com/office/drawing/2014/main" id="{8285EAB2-DBE3-4C0C-83E5-C855C6F8981C}"/>
+                <a16:creationId xmlns:a16="http://schemas.microsoft.com/office/drawing/2014/main" id="{039C04F1-C087-4722-9AAF-758A18B1D1E3}"/>
               </a:ext>
             </a:extLst>
           </p:cNvPr>
@@ -15324,7 +14872,7 @@
                 <a:ea typeface="+mj-ea"/>
                 <a:cs typeface="+mj-cs"/>
               </a:rPr>
-              <a:t>Qu’allons-nous créer ?</a:t>
+              <a:t>Qu’est-ce que Fab-IoT-Lab ?</a:t>
             </a:r>
           </a:p>
         </p:txBody>
@@ -15334,7 +14882,7 @@
           <p:cNvPr id="7" name="Espace réservé du texte 6">
             <a:extLst>
               <a:ext uri="{FF2B5EF4-FFF2-40B4-BE49-F238E27FC236}">
-                <a16:creationId xmlns:a16="http://schemas.microsoft.com/office/drawing/2014/main" id="{7151A2E3-79EC-4A76-8046-1CB1F2DC3E34}"/>
+                <a16:creationId xmlns:a16="http://schemas.microsoft.com/office/drawing/2014/main" id="{481CD277-E25B-4923-A709-7B77720D310D}"/>
               </a:ext>
             </a:extLst>
           </p:cNvPr>
@@ -15373,7 +14921,7 @@
           <p:cNvPr id="5" name="Espace réservé du numéro de diapositive 4">
             <a:extLst>
               <a:ext uri="{FF2B5EF4-FFF2-40B4-BE49-F238E27FC236}">
-                <a16:creationId xmlns:a16="http://schemas.microsoft.com/office/drawing/2014/main" id="{65768B4A-51C9-4342-A9C3-5D4587815908}"/>
+                <a16:creationId xmlns:a16="http://schemas.microsoft.com/office/drawing/2014/main" id="{283A00C4-72B8-41F4-9640-A3A4CD94A1E5}"/>
               </a:ext>
             </a:extLst>
           </p:cNvPr>
@@ -15391,7 +14939,7 @@
           <a:p>
             <a:fld id="{7D3627B9-1F90-4568-B521-4CB3E5CC102E}" type="slidenum">
               <a:rPr lang="fr-BE" smtClean="0"/>
-              <a:t>7</a:t>
+              <a:t>4</a:t>
             </a:fld>
             <a:endParaRPr lang="fr-BE"/>
           </a:p>
@@ -15400,7 +14948,7 @@
     </p:spTree>
     <p:extLst>
       <p:ext uri="{BB962C8B-B14F-4D97-AF65-F5344CB8AC3E}">
-        <p14:creationId xmlns:p14="http://schemas.microsoft.com/office/powerpoint/2010/main" val="3414970216"/>
+        <p14:creationId xmlns:p14="http://schemas.microsoft.com/office/powerpoint/2010/main" val="2415528101"/>
       </p:ext>
     </p:extLst>
   </p:cSld>
@@ -15410,7 +14958,269 @@
 </p:sld>
 </file>
 
-<file path=ppt/slides/slide8.xml><?xml version="1.0" encoding="utf-8"?>
+<file path=ppt/slides/slide5.xml><?xml version="1.0" encoding="utf-8"?>
+<p:sld xmlns:a="http://schemas.openxmlformats.org/drawingml/2006/main" xmlns:r="http://schemas.openxmlformats.org/officeDocument/2006/relationships" xmlns:p="http://schemas.openxmlformats.org/presentationml/2006/main">
+  <p:cSld>
+    <p:spTree>
+      <p:nvGrpSpPr>
+        <p:cNvPr id="1" name=""/>
+        <p:cNvGrpSpPr/>
+        <p:nvPr/>
+      </p:nvGrpSpPr>
+      <p:grpSpPr>
+        <a:xfrm>
+          <a:off x="0" y="0"/>
+          <a:ext cx="0" cy="0"/>
+          <a:chOff x="0" y="0"/>
+          <a:chExt cx="0" cy="0"/>
+        </a:xfrm>
+      </p:grpSpPr>
+      <p:sp>
+        <p:nvSpPr>
+          <p:cNvPr id="2" name="Titre 1">
+            <a:extLst>
+              <a:ext uri="{FF2B5EF4-FFF2-40B4-BE49-F238E27FC236}">
+                <a16:creationId xmlns:a16="http://schemas.microsoft.com/office/drawing/2014/main" id="{21729781-F766-44B3-9C6C-44939FE4CA80}"/>
+              </a:ext>
+            </a:extLst>
+          </p:cNvPr>
+          <p:cNvSpPr>
+            <a:spLocks noGrp="1"/>
+          </p:cNvSpPr>
+          <p:nvPr>
+            <p:ph type="title"/>
+          </p:nvPr>
+        </p:nvSpPr>
+        <p:spPr/>
+        <p:txBody>
+          <a:bodyPr/>
+          <a:lstStyle/>
+          <a:p>
+            <a:endParaRPr lang="fr-BE" dirty="0"/>
+          </a:p>
+        </p:txBody>
+      </p:sp>
+      <p:pic>
+        <p:nvPicPr>
+          <p:cNvPr id="7" name="Espace réservé du contenu 6">
+            <a:extLst>
+              <a:ext uri="{FF2B5EF4-FFF2-40B4-BE49-F238E27FC236}">
+                <a16:creationId xmlns:a16="http://schemas.microsoft.com/office/drawing/2014/main" id="{C9A3869D-FA32-4C42-974C-910FEAD4849A}"/>
+              </a:ext>
+            </a:extLst>
+          </p:cNvPr>
+          <p:cNvPicPr>
+            <a:picLocks noGrp="1" noChangeAspect="1"/>
+          </p:cNvPicPr>
+          <p:nvPr>
+            <p:ph sz="half" idx="1"/>
+          </p:nvPr>
+        </p:nvPicPr>
+        <p:blipFill rotWithShape="1">
+          <a:blip r:embed="rId3">
+            <a:extLst>
+              <a:ext uri="{28A0092B-C50C-407E-A947-70E740481C1C}">
+                <a14:useLocalDpi xmlns:a14="http://schemas.microsoft.com/office/drawing/2010/main" val="0"/>
+              </a:ext>
+            </a:extLst>
+          </a:blip>
+          <a:stretch/>
+        </p:blipFill>
+        <p:spPr>
+          <a:xfrm>
+            <a:off x="838200" y="2167426"/>
+            <a:ext cx="5181600" cy="3667735"/>
+          </a:xfrm>
+        </p:spPr>
+      </p:pic>
+      <p:pic>
+        <p:nvPicPr>
+          <p:cNvPr id="6146" name="Picture 2" descr="RÃ©sultat de recherche d'images pour &quot;umons&quot;">
+            <a:extLst>
+              <a:ext uri="{FF2B5EF4-FFF2-40B4-BE49-F238E27FC236}">
+                <a16:creationId xmlns:a16="http://schemas.microsoft.com/office/drawing/2014/main" id="{79C583BB-B5E5-4044-84A3-DD00A2E4AB11}"/>
+              </a:ext>
+            </a:extLst>
+          </p:cNvPr>
+          <p:cNvPicPr>
+            <a:picLocks noGrp="1" noChangeAspect="1" noChangeArrowheads="1"/>
+          </p:cNvPicPr>
+          <p:nvPr>
+            <p:ph sz="half" idx="2"/>
+          </p:nvPr>
+        </p:nvPicPr>
+        <p:blipFill>
+          <a:blip r:embed="rId4">
+            <a:extLst>
+              <a:ext uri="{28A0092B-C50C-407E-A947-70E740481C1C}">
+                <a14:useLocalDpi xmlns:a14="http://schemas.microsoft.com/office/drawing/2010/main" val="0"/>
+              </a:ext>
+            </a:extLst>
+          </a:blip>
+          <a:stretch>
+            <a:fillRect/>
+          </a:stretch>
+        </p:blipFill>
+        <p:spPr bwMode="auto">
+          <a:xfrm>
+            <a:off x="6573012" y="3214910"/>
+            <a:ext cx="4379976" cy="1572768"/>
+          </a:xfrm>
+          <a:prstGeom prst="rect">
+            <a:avLst/>
+          </a:prstGeom>
+          <a:noFill/>
+          <a:extLst>
+            <a:ext uri="{909E8E84-426E-40DD-AFC4-6F175D3DCCD1}">
+              <a14:hiddenFill xmlns:a14="http://schemas.microsoft.com/office/drawing/2010/main">
+                <a:solidFill>
+                  <a:srgbClr val="FFFFFF"/>
+                </a:solidFill>
+              </a14:hiddenFill>
+            </a:ext>
+          </a:extLst>
+        </p:spPr>
+      </p:pic>
+      <p:sp>
+        <p:nvSpPr>
+          <p:cNvPr id="5" name="Espace réservé du numéro de diapositive 4">
+            <a:extLst>
+              <a:ext uri="{FF2B5EF4-FFF2-40B4-BE49-F238E27FC236}">
+                <a16:creationId xmlns:a16="http://schemas.microsoft.com/office/drawing/2014/main" id="{9A43EBC4-261A-4A9D-A733-F5D8FF996C77}"/>
+              </a:ext>
+            </a:extLst>
+          </p:cNvPr>
+          <p:cNvSpPr>
+            <a:spLocks noGrp="1"/>
+          </p:cNvSpPr>
+          <p:nvPr>
+            <p:ph type="sldNum" sz="quarter" idx="12"/>
+          </p:nvPr>
+        </p:nvSpPr>
+        <p:spPr/>
+        <p:txBody>
+          <a:bodyPr/>
+          <a:lstStyle/>
+          <a:p>
+            <a:fld id="{7D3627B9-1F90-4568-B521-4CB3E5CC102E}" type="slidenum">
+              <a:rPr lang="fr-BE" smtClean="0"/>
+              <a:t>5</a:t>
+            </a:fld>
+            <a:endParaRPr lang="fr-BE"/>
+          </a:p>
+        </p:txBody>
+      </p:sp>
+    </p:spTree>
+    <p:extLst>
+      <p:ext uri="{BB962C8B-B14F-4D97-AF65-F5344CB8AC3E}">
+        <p14:creationId xmlns:p14="http://schemas.microsoft.com/office/powerpoint/2010/main" val="953089894"/>
+      </p:ext>
+    </p:extLst>
+  </p:cSld>
+  <p:clrMapOvr>
+    <a:masterClrMapping/>
+  </p:clrMapOvr>
+</p:sld>
+</file>
+
+<file path=ppt/slides/slide6.xml><?xml version="1.0" encoding="utf-8"?>
+<p:sld xmlns:a="http://schemas.openxmlformats.org/drawingml/2006/main" xmlns:r="http://schemas.openxmlformats.org/officeDocument/2006/relationships" xmlns:p="http://schemas.openxmlformats.org/presentationml/2006/main">
+  <p:cSld>
+    <p:spTree>
+      <p:nvGrpSpPr>
+        <p:cNvPr id="1" name=""/>
+        <p:cNvGrpSpPr/>
+        <p:nvPr/>
+      </p:nvGrpSpPr>
+      <p:grpSpPr>
+        <a:xfrm>
+          <a:off x="0" y="0"/>
+          <a:ext cx="0" cy="0"/>
+          <a:chOff x="0" y="0"/>
+          <a:chExt cx="0" cy="0"/>
+        </a:xfrm>
+      </p:grpSpPr>
+      <p:pic>
+        <p:nvPicPr>
+          <p:cNvPr id="5" name="Espace réservé du contenu 4">
+            <a:extLst>
+              <a:ext uri="{FF2B5EF4-FFF2-40B4-BE49-F238E27FC236}">
+                <a16:creationId xmlns:a16="http://schemas.microsoft.com/office/drawing/2014/main" id="{B6BEDA4F-2E95-491B-8C08-B9B380E2F29F}"/>
+              </a:ext>
+            </a:extLst>
+          </p:cNvPr>
+          <p:cNvPicPr>
+            <a:picLocks noGrp="1" noChangeAspect="1"/>
+          </p:cNvPicPr>
+          <p:nvPr>
+            <p:ph idx="1"/>
+          </p:nvPr>
+        </p:nvPicPr>
+        <p:blipFill>
+          <a:blip r:embed="rId3">
+            <a:extLst>
+              <a:ext uri="{28A0092B-C50C-407E-A947-70E740481C1C}">
+                <a14:useLocalDpi xmlns:a14="http://schemas.microsoft.com/office/drawing/2010/main" val="0"/>
+              </a:ext>
+            </a:extLst>
+          </a:blip>
+          <a:stretch>
+            <a:fillRect/>
+          </a:stretch>
+        </p:blipFill>
+        <p:spPr>
+          <a:xfrm>
+            <a:off x="643467" y="2052235"/>
+            <a:ext cx="10905066" cy="2753529"/>
+          </a:xfrm>
+          <a:prstGeom prst="rect">
+            <a:avLst/>
+          </a:prstGeom>
+        </p:spPr>
+      </p:pic>
+      <p:sp>
+        <p:nvSpPr>
+          <p:cNvPr id="4" name="Espace réservé du numéro de diapositive 3">
+            <a:extLst>
+              <a:ext uri="{FF2B5EF4-FFF2-40B4-BE49-F238E27FC236}">
+                <a16:creationId xmlns:a16="http://schemas.microsoft.com/office/drawing/2014/main" id="{1FB0FEB1-1455-411C-BE19-4594C1F5C317}"/>
+              </a:ext>
+            </a:extLst>
+          </p:cNvPr>
+          <p:cNvSpPr>
+            <a:spLocks noGrp="1"/>
+          </p:cNvSpPr>
+          <p:nvPr>
+            <p:ph type="sldNum" sz="quarter" idx="12"/>
+          </p:nvPr>
+        </p:nvSpPr>
+        <p:spPr/>
+        <p:txBody>
+          <a:bodyPr/>
+          <a:lstStyle/>
+          <a:p>
+            <a:fld id="{7D3627B9-1F90-4568-B521-4CB3E5CC102E}" type="slidenum">
+              <a:rPr lang="fr-BE" smtClean="0"/>
+              <a:t>6</a:t>
+            </a:fld>
+            <a:endParaRPr lang="fr-BE"/>
+          </a:p>
+        </p:txBody>
+      </p:sp>
+    </p:spTree>
+    <p:extLst>
+      <p:ext uri="{BB962C8B-B14F-4D97-AF65-F5344CB8AC3E}">
+        <p14:creationId xmlns:p14="http://schemas.microsoft.com/office/powerpoint/2010/main" val="2676247997"/>
+      </p:ext>
+    </p:extLst>
+  </p:cSld>
+  <p:clrMapOvr>
+    <a:masterClrMapping/>
+  </p:clrMapOvr>
+</p:sld>
+</file>
+
+<file path=ppt/slides/slide7.xml><?xml version="1.0" encoding="utf-8"?>
 <p:sld xmlns:a="http://schemas.openxmlformats.org/drawingml/2006/main" xmlns:r="http://schemas.openxmlformats.org/officeDocument/2006/relationships" xmlns:p="http://schemas.openxmlformats.org/presentationml/2006/main">
   <p:cSld>
     <p:bg>
@@ -15437,7 +15247,7 @@
       </p:grpSpPr>
       <p:sp>
         <p:nvSpPr>
-          <p:cNvPr id="10" name="Rectangle 9">
+          <p:cNvPr id="12" name="Rectangle 11">
             <a:extLst>
               <a:ext uri="{FF2B5EF4-FFF2-40B4-BE49-F238E27FC236}">
                 <a16:creationId xmlns:a16="http://schemas.microsoft.com/office/drawing/2014/main" id="{86197D16-FE75-4A0E-A0C9-28C0F04A43DF}"/>
@@ -15522,7 +15332,7 @@
       </p:sp>
       <p:pic>
         <p:nvPicPr>
-          <p:cNvPr id="12" name="Picture 11">
+          <p:cNvPr id="14" name="Picture 13">
             <a:extLst>
               <a:ext uri="{FF2B5EF4-FFF2-40B4-BE49-F238E27FC236}">
                 <a16:creationId xmlns:a16="http://schemas.microsoft.com/office/drawing/2014/main" id="{FA8FCEC6-4B30-4FF2-8B32-504BEAEA3A16}"/>
@@ -15544,7 +15354,7 @@
           </p:nvPr>
         </p:nvPicPr>
         <p:blipFill>
-          <a:blip r:embed="rId2">
+          <a:blip r:embed="rId3">
             <a:extLst>
               <a:ext uri="{28A0092B-C50C-407E-A947-70E740481C1C}">
                 <a14:useLocalDpi xmlns:a14="http://schemas.microsoft.com/office/drawing/2010/main" val="0"/>
@@ -15611,10 +15421,10 @@
       </p:pic>
       <p:sp>
         <p:nvSpPr>
-          <p:cNvPr id="4" name="Titre 3">
+          <p:cNvPr id="2" name="Titre 1">
             <a:extLst>
               <a:ext uri="{FF2B5EF4-FFF2-40B4-BE49-F238E27FC236}">
-                <a16:creationId xmlns:a16="http://schemas.microsoft.com/office/drawing/2014/main" id="{6B89D041-0C38-436F-AB3D-AD4755663581}"/>
+                <a16:creationId xmlns:a16="http://schemas.microsoft.com/office/drawing/2014/main" id="{8285EAB2-DBE3-4C0C-83E5-C855C6F8981C}"/>
               </a:ext>
             </a:extLst>
           </p:cNvPr>
@@ -15646,17 +15456,17 @@
                 <a:ea typeface="+mj-ea"/>
                 <a:cs typeface="+mj-cs"/>
               </a:rPr>
-              <a:t>C’est quoi un microcontrôleur ?</a:t>
-            </a:r>
-          </a:p>
-        </p:txBody>
-      </p:sp>
-      <p:sp>
-        <p:nvSpPr>
-          <p:cNvPr id="5" name="Espace réservé du texte 4">
+              <a:t>Qu’allons-nous créer ?</a:t>
+            </a:r>
+          </a:p>
+        </p:txBody>
+      </p:sp>
+      <p:sp>
+        <p:nvSpPr>
+          <p:cNvPr id="7" name="Espace réservé du texte 6">
             <a:extLst>
               <a:ext uri="{FF2B5EF4-FFF2-40B4-BE49-F238E27FC236}">
-                <a16:creationId xmlns:a16="http://schemas.microsoft.com/office/drawing/2014/main" id="{5AAE6025-AC30-4ABD-B63E-53C027F280AA}"/>
+                <a16:creationId xmlns:a16="http://schemas.microsoft.com/office/drawing/2014/main" id="{7151A2E3-79EC-4A76-8046-1CB1F2DC3E34}"/>
               </a:ext>
             </a:extLst>
           </p:cNvPr>
@@ -15692,10 +15502,128 @@
       </p:sp>
       <p:sp>
         <p:nvSpPr>
-          <p:cNvPr id="3" name="Espace réservé du numéro de diapositive 2">
+          <p:cNvPr id="5" name="Espace réservé du numéro de diapositive 4">
             <a:extLst>
               <a:ext uri="{FF2B5EF4-FFF2-40B4-BE49-F238E27FC236}">
-                <a16:creationId xmlns:a16="http://schemas.microsoft.com/office/drawing/2014/main" id="{5FB7E4E2-0DF0-4527-958C-D90E55FC1790}"/>
+                <a16:creationId xmlns:a16="http://schemas.microsoft.com/office/drawing/2014/main" id="{65768B4A-51C9-4342-A9C3-5D4587815908}"/>
+              </a:ext>
+            </a:extLst>
+          </p:cNvPr>
+          <p:cNvSpPr>
+            <a:spLocks noGrp="1"/>
+          </p:cNvSpPr>
+          <p:nvPr>
+            <p:ph type="sldNum" sz="quarter" idx="12"/>
+          </p:nvPr>
+        </p:nvSpPr>
+        <p:spPr/>
+        <p:txBody>
+          <a:bodyPr/>
+          <a:lstStyle/>
+          <a:p>
+            <a:fld id="{7D3627B9-1F90-4568-B521-4CB3E5CC102E}" type="slidenum">
+              <a:rPr lang="fr-BE" smtClean="0"/>
+              <a:t>7</a:t>
+            </a:fld>
+            <a:endParaRPr lang="fr-BE"/>
+          </a:p>
+        </p:txBody>
+      </p:sp>
+    </p:spTree>
+    <p:extLst>
+      <p:ext uri="{BB962C8B-B14F-4D97-AF65-F5344CB8AC3E}">
+        <p14:creationId xmlns:p14="http://schemas.microsoft.com/office/powerpoint/2010/main" val="3414970216"/>
+      </p:ext>
+    </p:extLst>
+  </p:cSld>
+  <p:clrMapOvr>
+    <a:masterClrMapping/>
+  </p:clrMapOvr>
+</p:sld>
+</file>
+
+<file path=ppt/slides/slide8.xml><?xml version="1.0" encoding="utf-8"?>
+<p:sld xmlns:a="http://schemas.openxmlformats.org/drawingml/2006/main" xmlns:r="http://schemas.openxmlformats.org/officeDocument/2006/relationships" xmlns:p="http://schemas.openxmlformats.org/presentationml/2006/main">
+  <p:cSld>
+    <p:spTree>
+      <p:nvGrpSpPr>
+        <p:cNvPr id="1" name=""/>
+        <p:cNvGrpSpPr/>
+        <p:nvPr/>
+      </p:nvGrpSpPr>
+      <p:grpSpPr>
+        <a:xfrm>
+          <a:off x="0" y="0"/>
+          <a:ext cx="0" cy="0"/>
+          <a:chOff x="0" y="0"/>
+          <a:chExt cx="0" cy="0"/>
+        </a:xfrm>
+      </p:grpSpPr>
+      <p:sp>
+        <p:nvSpPr>
+          <p:cNvPr id="5" name="Titre 4">
+            <a:extLst>
+              <a:ext uri="{FF2B5EF4-FFF2-40B4-BE49-F238E27FC236}">
+                <a16:creationId xmlns:a16="http://schemas.microsoft.com/office/drawing/2014/main" id="{A833588F-8E9F-4646-A593-5367F5967DFE}"/>
+              </a:ext>
+            </a:extLst>
+          </p:cNvPr>
+          <p:cNvSpPr>
+            <a:spLocks noGrp="1"/>
+          </p:cNvSpPr>
+          <p:nvPr>
+            <p:ph type="title"/>
+          </p:nvPr>
+        </p:nvSpPr>
+        <p:spPr/>
+        <p:txBody>
+          <a:bodyPr/>
+          <a:lstStyle/>
+          <a:p>
+            <a:endParaRPr lang="fr-BE"/>
+          </a:p>
+        </p:txBody>
+      </p:sp>
+      <p:sp>
+        <p:nvSpPr>
+          <p:cNvPr id="6" name="Espace réservé du contenu 5">
+            <a:extLst>
+              <a:ext uri="{FF2B5EF4-FFF2-40B4-BE49-F238E27FC236}">
+                <a16:creationId xmlns:a16="http://schemas.microsoft.com/office/drawing/2014/main" id="{566AEC96-D2B4-475B-86FF-6A91DCBDA576}"/>
+              </a:ext>
+            </a:extLst>
+          </p:cNvPr>
+          <p:cNvSpPr>
+            <a:spLocks noGrp="1"/>
+          </p:cNvSpPr>
+          <p:nvPr>
+            <p:ph idx="1"/>
+          </p:nvPr>
+        </p:nvSpPr>
+        <p:spPr/>
+        <p:txBody>
+          <a:bodyPr anchor="ctr"/>
+          <a:lstStyle/>
+          <a:p>
+            <a:pPr marL="0" indent="0" algn="ctr">
+              <a:buNone/>
+            </a:pPr>
+            <a:r>
+              <a:rPr lang="fr-BE" dirty="0">
+                <a:hlinkClick r:id="rId2"/>
+              </a:rPr>
+              <a:t>https://github.com/FabLabMons/iotlab-connectedobject-workshop</a:t>
+            </a:r>
+            <a:endParaRPr lang="fr-BE" dirty="0"/>
+          </a:p>
+        </p:txBody>
+      </p:sp>
+      <p:sp>
+        <p:nvSpPr>
+          <p:cNvPr id="4" name="Espace réservé du numéro de diapositive 3">
+            <a:extLst>
+              <a:ext uri="{FF2B5EF4-FFF2-40B4-BE49-F238E27FC236}">
+                <a16:creationId xmlns:a16="http://schemas.microsoft.com/office/drawing/2014/main" id="{7CCEA6B9-DD4B-4658-A5D5-388656D2D143}"/>
               </a:ext>
             </a:extLst>
           </p:cNvPr>
@@ -15722,7 +15650,7 @@
     </p:spTree>
     <p:extLst>
       <p:ext uri="{BB962C8B-B14F-4D97-AF65-F5344CB8AC3E}">
-        <p14:creationId xmlns:p14="http://schemas.microsoft.com/office/powerpoint/2010/main" val="4124027447"/>
+        <p14:creationId xmlns:p14="http://schemas.microsoft.com/office/powerpoint/2010/main" val="3287411062"/>
       </p:ext>
     </p:extLst>
   </p:cSld>
@@ -15759,72 +15687,226 @@
       </p:grpSpPr>
       <p:sp>
         <p:nvSpPr>
-          <p:cNvPr id="2" name="Titre 1">
+          <p:cNvPr id="10" name="Rectangle 9">
             <a:extLst>
               <a:ext uri="{FF2B5EF4-FFF2-40B4-BE49-F238E27FC236}">
-                <a16:creationId xmlns:a16="http://schemas.microsoft.com/office/drawing/2014/main" id="{C5F8775F-9662-4050-98FB-A838A4FEE2C8}"/>
+                <a16:creationId xmlns:a16="http://schemas.microsoft.com/office/drawing/2014/main" id="{86197D16-FE75-4A0E-A0C9-28C0F04A43DF}"/>
+              </a:ext>
+              <a:ext uri="{C183D7F6-B498-43B3-948B-1728B52AA6E4}">
+                <adec:decorative xmlns:adec="http://schemas.microsoft.com/office/drawing/2017/decorative" val="1"/>
               </a:ext>
             </a:extLst>
           </p:cNvPr>
           <p:cNvSpPr>
-            <a:spLocks noGrp="1"/>
-          </p:cNvSpPr>
-          <p:nvPr>
-            <p:ph type="title"/>
-          </p:nvPr>
-        </p:nvSpPr>
-        <p:spPr/>
-        <p:txBody>
-          <a:bodyPr/>
+            <a:spLocks noGrp="1" noRot="1" noChangeAspect="1" noMove="1" noResize="1" noEditPoints="1" noAdjustHandles="1" noChangeArrowheads="1" noChangeShapeType="1" noTextEdit="1"/>
+          </p:cNvSpPr>
+          <p:nvPr>
+            <p:extLst>
+              <p:ext uri="{386F3935-93C4-4BCD-93E2-E3B085C9AB24}">
+                <p16:designElem xmlns:p16="http://schemas.microsoft.com/office/powerpoint/2015/main" val="1"/>
+              </p:ext>
+            </p:extLst>
+          </p:nvPr>
+        </p:nvSpPr>
+        <p:spPr>
+          <a:xfrm>
+            <a:off x="0" y="0"/>
+            <a:ext cx="12192000" cy="5570220"/>
+          </a:xfrm>
+          <a:prstGeom prst="rect">
+            <a:avLst/>
+          </a:prstGeom>
+          <a:gradFill>
+            <a:gsLst>
+              <a:gs pos="0">
+                <a:schemeClr val="accent1">
+                  <a:lumMod val="90000"/>
+                </a:schemeClr>
+              </a:gs>
+              <a:gs pos="25000">
+                <a:schemeClr val="accent1">
+                  <a:lumMod val="90000"/>
+                </a:schemeClr>
+              </a:gs>
+              <a:gs pos="94000">
+                <a:schemeClr val="bg2">
+                  <a:lumMod val="25000"/>
+                </a:schemeClr>
+              </a:gs>
+              <a:gs pos="100000">
+                <a:schemeClr val="bg2">
+                  <a:lumMod val="25000"/>
+                </a:schemeClr>
+              </a:gs>
+            </a:gsLst>
+            <a:lin ang="4200000" scaled="0"/>
+          </a:gradFill>
+          <a:ln>
+            <a:noFill/>
+          </a:ln>
+        </p:spPr>
+        <p:style>
+          <a:lnRef idx="2">
+            <a:schemeClr val="accent1">
+              <a:shade val="50000"/>
+            </a:schemeClr>
+          </a:lnRef>
+          <a:fillRef idx="1">
+            <a:schemeClr val="accent1"/>
+          </a:fillRef>
+          <a:effectRef idx="0">
+            <a:schemeClr val="accent1"/>
+          </a:effectRef>
+          <a:fontRef idx="minor">
+            <a:schemeClr val="lt1"/>
+          </a:fontRef>
+        </p:style>
+        <p:txBody>
+          <a:bodyPr rtlCol="0" anchor="ctr"/>
           <a:lstStyle/>
           <a:p>
-            <a:r>
-              <a:rPr lang="en-US"/>
-              <a:t>ESP8266</a:t>
-            </a:r>
+            <a:pPr algn="ctr"/>
+            <a:endParaRPr lang="en-US"/>
           </a:p>
         </p:txBody>
       </p:sp>
       <p:pic>
         <p:nvPicPr>
-          <p:cNvPr id="1026" name="Picture 2" descr="RÃ©sultat de recherche d'images pour &quot;nodemcu esp8266 amica&quot;">
+          <p:cNvPr id="12" name="Picture 11">
             <a:extLst>
               <a:ext uri="{FF2B5EF4-FFF2-40B4-BE49-F238E27FC236}">
-                <a16:creationId xmlns:a16="http://schemas.microsoft.com/office/drawing/2014/main" id="{C57719E7-0D22-41C8-B7F4-DEC8BBF076D5}"/>
+                <a16:creationId xmlns:a16="http://schemas.microsoft.com/office/drawing/2014/main" id="{FA8FCEC6-4B30-4FF2-8B32-504BEAEA3A16}"/>
+              </a:ext>
+              <a:ext uri="{C183D7F6-B498-43B3-948B-1728B52AA6E4}">
+                <adec:decorative xmlns:adec="http://schemas.microsoft.com/office/drawing/2017/decorative" val="1"/>
               </a:ext>
             </a:extLst>
           </p:cNvPr>
           <p:cNvPicPr>
-            <a:picLocks noGrp="1" noChangeAspect="1" noChangeArrowheads="1"/>
+            <a:picLocks noGrp="1" noRot="1" noChangeAspect="1" noMove="1" noResize="1" noEditPoints="1" noAdjustHandles="1" noChangeArrowheads="1" noChangeShapeType="1" noCrop="1"/>
           </p:cNvPicPr>
           <p:nvPr>
-            <p:ph idx="1"/>
+            <p:extLst>
+              <p:ext uri="{386F3935-93C4-4BCD-93E2-E3B085C9AB24}">
+                <p16:designElem xmlns:p16="http://schemas.microsoft.com/office/powerpoint/2015/main" val="1"/>
+              </p:ext>
+            </p:extLst>
           </p:nvPr>
         </p:nvPicPr>
-        <p:blipFill rotWithShape="1">
-          <a:blip r:embed="rId3">
+        <p:blipFill>
+          <a:blip r:embed="rId2">
             <a:extLst>
               <a:ext uri="{28A0092B-C50C-407E-A947-70E740481C1C}">
                 <a14:useLocalDpi xmlns:a14="http://schemas.microsoft.com/office/drawing/2010/main" val="0"/>
               </a:ext>
             </a:extLst>
           </a:blip>
-          <a:srcRect t="6758" b="8972"/>
-          <a:stretch/>
+          <a:srcRect t="45716" b="9820"/>
+          <a:stretch>
+            <a:fillRect/>
+          </a:stretch>
         </p:blipFill>
         <p:spPr>
           <a:xfrm>
-            <a:off x="2224534" y="1825625"/>
-            <a:ext cx="7742931" cy="4351338"/>
+            <a:off x="0" y="3808676"/>
+            <a:ext cx="12192000" cy="3049325"/>
+          </a:xfrm>
+          <a:custGeom>
+            <a:avLst/>
+            <a:gdLst>
+              <a:gd name="connsiteX0" fmla="*/ 0 w 12192000"/>
+              <a:gd name="connsiteY0" fmla="*/ 0 h 3049325"/>
+              <a:gd name="connsiteX1" fmla="*/ 12192000 w 12192000"/>
+              <a:gd name="connsiteY1" fmla="*/ 0 h 3049325"/>
+              <a:gd name="connsiteX2" fmla="*/ 12192000 w 12192000"/>
+              <a:gd name="connsiteY2" fmla="*/ 3049325 h 3049325"/>
+              <a:gd name="connsiteX3" fmla="*/ 0 w 12192000"/>
+              <a:gd name="connsiteY3" fmla="*/ 3049325 h 3049325"/>
+            </a:gdLst>
+            <a:ahLst/>
+            <a:cxnLst>
+              <a:cxn ang="0">
+                <a:pos x="connsiteX0" y="connsiteY0"/>
+              </a:cxn>
+              <a:cxn ang="0">
+                <a:pos x="connsiteX1" y="connsiteY1"/>
+              </a:cxn>
+              <a:cxn ang="0">
+                <a:pos x="connsiteX2" y="connsiteY2"/>
+              </a:cxn>
+              <a:cxn ang="0">
+                <a:pos x="connsiteX3" y="connsiteY3"/>
+              </a:cxn>
+            </a:cxnLst>
+            <a:rect l="l" t="t" r="r" b="b"/>
+            <a:pathLst>
+              <a:path w="12192000" h="3049325">
+                <a:moveTo>
+                  <a:pt x="0" y="0"/>
+                </a:moveTo>
+                <a:lnTo>
+                  <a:pt x="12192000" y="0"/>
+                </a:lnTo>
+                <a:lnTo>
+                  <a:pt x="12192000" y="3049325"/>
+                </a:lnTo>
+                <a:lnTo>
+                  <a:pt x="0" y="3049325"/>
+                </a:lnTo>
+                <a:close/>
+              </a:path>
+            </a:pathLst>
+          </a:custGeom>
+        </p:spPr>
+      </p:pic>
+      <p:sp>
+        <p:nvSpPr>
+          <p:cNvPr id="4" name="Titre 3">
+            <a:extLst>
+              <a:ext uri="{FF2B5EF4-FFF2-40B4-BE49-F238E27FC236}">
+                <a16:creationId xmlns:a16="http://schemas.microsoft.com/office/drawing/2014/main" id="{6B89D041-0C38-436F-AB3D-AD4755663581}"/>
+              </a:ext>
+            </a:extLst>
+          </p:cNvPr>
+          <p:cNvSpPr>
+            <a:spLocks noGrp="1"/>
+          </p:cNvSpPr>
+          <p:nvPr>
+            <p:ph type="title"/>
+          </p:nvPr>
+        </p:nvSpPr>
+        <p:spPr>
+          <a:xfrm>
+            <a:off x="804484" y="1191796"/>
+            <a:ext cx="10021446" cy="2976344"/>
           </a:xfrm>
         </p:spPr>
-      </p:pic>
-      <p:sp>
-        <p:nvSpPr>
-          <p:cNvPr id="4" name="Espace réservé du numéro de diapositive 3">
+        <p:txBody>
+          <a:bodyPr vert="horz" lIns="91440" tIns="45720" rIns="91440" bIns="45720" rtlCol="0" anchor="ctr">
+            <a:normAutofit/>
+          </a:bodyPr>
+          <a:lstStyle/>
+          <a:p>
+            <a:r>
+              <a:rPr lang="en-US" sz="6600" kern="1200">
+                <a:solidFill>
+                  <a:srgbClr val="FFFFFF"/>
+                </a:solidFill>
+                <a:latin typeface="+mj-lt"/>
+                <a:ea typeface="+mj-ea"/>
+                <a:cs typeface="+mj-cs"/>
+              </a:rPr>
+              <a:t>C’est quoi un microcontrôleur ?</a:t>
+            </a:r>
+          </a:p>
+        </p:txBody>
+      </p:sp>
+      <p:sp>
+        <p:nvSpPr>
+          <p:cNvPr id="5" name="Espace réservé du texte 4">
             <a:extLst>
               <a:ext uri="{FF2B5EF4-FFF2-40B4-BE49-F238E27FC236}">
-                <a16:creationId xmlns:a16="http://schemas.microsoft.com/office/drawing/2014/main" id="{0A0CA7B0-2512-4C05-8663-5F6BFE309B05}"/>
+                <a16:creationId xmlns:a16="http://schemas.microsoft.com/office/drawing/2014/main" id="{5AAE6025-AC30-4ABD-B63E-53C027F280AA}"/>
               </a:ext>
             </a:extLst>
           </p:cNvPr>
@@ -15832,6 +15914,45 @@
             <a:spLocks noGrp="1"/>
           </p:cNvSpPr>
           <p:nvPr>
+            <p:ph type="body" idx="1"/>
+          </p:nvPr>
+        </p:nvSpPr>
+        <p:spPr>
+          <a:xfrm>
+            <a:off x="804788" y="5318990"/>
+            <a:ext cx="9416898" cy="723670"/>
+          </a:xfrm>
+        </p:spPr>
+        <p:txBody>
+          <a:bodyPr vert="horz" lIns="91440" tIns="45720" rIns="91440" bIns="45720" rtlCol="0" anchor="t">
+            <a:normAutofit/>
+          </a:bodyPr>
+          <a:lstStyle/>
+          <a:p>
+            <a:endParaRPr lang="en-US" sz="1800" kern="1200">
+              <a:solidFill>
+                <a:srgbClr val="000000"/>
+              </a:solidFill>
+              <a:latin typeface="+mn-lt"/>
+              <a:ea typeface="+mn-ea"/>
+              <a:cs typeface="+mn-cs"/>
+            </a:endParaRPr>
+          </a:p>
+        </p:txBody>
+      </p:sp>
+      <p:sp>
+        <p:nvSpPr>
+          <p:cNvPr id="3" name="Espace réservé du numéro de diapositive 2">
+            <a:extLst>
+              <a:ext uri="{FF2B5EF4-FFF2-40B4-BE49-F238E27FC236}">
+                <a16:creationId xmlns:a16="http://schemas.microsoft.com/office/drawing/2014/main" id="{5FB7E4E2-0DF0-4527-958C-D90E55FC1790}"/>
+              </a:ext>
+            </a:extLst>
+          </p:cNvPr>
+          <p:cNvSpPr>
+            <a:spLocks noGrp="1"/>
+          </p:cNvSpPr>
+          <p:nvPr>
             <p:ph type="sldNum" sz="quarter" idx="12"/>
           </p:nvPr>
         </p:nvSpPr>
@@ -15841,18 +15962,17 @@
           <a:lstStyle/>
           <a:p>
             <a:fld id="{7D3627B9-1F90-4568-B521-4CB3E5CC102E}" type="slidenum">
-              <a:rPr lang="en-US" smtClean="0"/>
-              <a:pPr/>
+              <a:rPr lang="fr-BE" smtClean="0"/>
               <a:t>9</a:t>
             </a:fld>
-            <a:endParaRPr lang="en-US"/>
+            <a:endParaRPr lang="fr-BE"/>
           </a:p>
         </p:txBody>
       </p:sp>
     </p:spTree>
     <p:extLst>
       <p:ext uri="{BB962C8B-B14F-4D97-AF65-F5344CB8AC3E}">
-        <p14:creationId xmlns:p14="http://schemas.microsoft.com/office/powerpoint/2010/main" val="3504272572"/>
+        <p14:creationId xmlns:p14="http://schemas.microsoft.com/office/powerpoint/2010/main" val="4124027447"/>
       </p:ext>
     </p:extLst>
   </p:cSld>

</xml_diff>

<commit_message>
Add servo wiring to slides
</commit_message>
<xml_diff>
--- a/201809-FabIoTLab-Objet connecte.pptx
+++ b/201809-FabIoTLab-Objet connecte.pptx
@@ -10229,6 +10229,42 @@
           </a:p>
         </p:txBody>
       </p:sp>
+      <p:pic>
+        <p:nvPicPr>
+          <p:cNvPr id="6" name="Image 5" descr="Une image contenant équipement électronique&#10;&#10;Description générée avec un niveau de confiance élevé">
+            <a:extLst>
+              <a:ext uri="{FF2B5EF4-FFF2-40B4-BE49-F238E27FC236}">
+                <a16:creationId xmlns:a16="http://schemas.microsoft.com/office/drawing/2014/main" id="{ECDC42D4-EEDC-467E-8B1B-C1B4D1744893}"/>
+              </a:ext>
+            </a:extLst>
+          </p:cNvPr>
+          <p:cNvPicPr>
+            <a:picLocks noChangeAspect="1"/>
+          </p:cNvPicPr>
+          <p:nvPr/>
+        </p:nvPicPr>
+        <p:blipFill>
+          <a:blip r:embed="rId2">
+            <a:extLst>
+              <a:ext uri="{28A0092B-C50C-407E-A947-70E740481C1C}">
+                <a14:useLocalDpi xmlns:a14="http://schemas.microsoft.com/office/drawing/2010/main" val="0"/>
+              </a:ext>
+            </a:extLst>
+          </a:blip>
+          <a:stretch>
+            <a:fillRect/>
+          </a:stretch>
+        </p:blipFill>
+        <p:spPr>
+          <a:xfrm>
+            <a:off x="3578578" y="2452909"/>
+            <a:ext cx="7775222" cy="3724054"/>
+          </a:xfrm>
+          <a:prstGeom prst="rect">
+            <a:avLst/>
+          </a:prstGeom>
+        </p:spPr>
+      </p:pic>
     </p:spTree>
     <p:extLst>
       <p:ext uri="{BB962C8B-B14F-4D97-AF65-F5344CB8AC3E}">

</xml_diff>